<commit_message>
Work on day 1 and 2
</commit_message>
<xml_diff>
--- a/dia1/intro.pptx
+++ b/dia1/intro.pptx
@@ -5,25 +5,17 @@
     <p:sldMasterId id="2147483660" r:id="rId1"/>
   </p:sldMasterIdLst>
   <p:notesMasterIdLst>
-    <p:notesMasterId r:id="rId18"/>
+    <p:notesMasterId r:id="rId10"/>
   </p:notesMasterIdLst>
   <p:sldIdLst>
-    <p:sldId id="256" r:id="rId2"/>
-    <p:sldId id="274" r:id="rId3"/>
-    <p:sldId id="275" r:id="rId4"/>
-    <p:sldId id="276" r:id="rId5"/>
-    <p:sldId id="277" r:id="rId6"/>
-    <p:sldId id="278" r:id="rId7"/>
-    <p:sldId id="263" r:id="rId8"/>
-    <p:sldId id="264" r:id="rId9"/>
-    <p:sldId id="266" r:id="rId10"/>
-    <p:sldId id="281" r:id="rId11"/>
-    <p:sldId id="268" r:id="rId12"/>
-    <p:sldId id="269" r:id="rId13"/>
-    <p:sldId id="273" r:id="rId14"/>
-    <p:sldId id="271" r:id="rId15"/>
-    <p:sldId id="280" r:id="rId16"/>
-    <p:sldId id="279" r:id="rId17"/>
+    <p:sldId id="282" r:id="rId2"/>
+    <p:sldId id="283" r:id="rId3"/>
+    <p:sldId id="284" r:id="rId4"/>
+    <p:sldId id="285" r:id="rId5"/>
+    <p:sldId id="286" r:id="rId6"/>
+    <p:sldId id="287" r:id="rId7"/>
+    <p:sldId id="288" r:id="rId8"/>
+    <p:sldId id="289" r:id="rId9"/>
   </p:sldIdLst>
   <p:sldSz cx="9144000" cy="6858000" type="screen4x3"/>
   <p:notesSz cx="6858000" cy="9144000"/>
@@ -227,7 +219,7 @@
           <a:p>
             <a:fld id="{0377424B-A23C-43FF-8673-376C6E767ED7}" type="datetimeFigureOut">
               <a:rPr lang="en-US" smtClean="0"/>
-              <a:t>1/6/2019</a:t>
+              <a:t>1/8/2019</a:t>
             </a:fld>
             <a:endParaRPr lang="en-US"/>
           </a:p>
@@ -494,90 +486,6 @@
 </p:notesMaster>
 </file>
 
-<file path=ppt/notesSlides/notesSlide1.xml><?xml version="1.0" encoding="utf-8"?>
-<p:notes xmlns:a="http://schemas.openxmlformats.org/drawingml/2006/main" xmlns:r="http://schemas.openxmlformats.org/officeDocument/2006/relationships" xmlns:p="http://schemas.openxmlformats.org/presentationml/2006/main">
-  <p:cSld>
-    <p:spTree>
-      <p:nvGrpSpPr>
-        <p:cNvPr id="1" name=""/>
-        <p:cNvGrpSpPr/>
-        <p:nvPr/>
-      </p:nvGrpSpPr>
-      <p:grpSpPr>
-        <a:xfrm>
-          <a:off x="0" y="0"/>
-          <a:ext cx="0" cy="0"/>
-          <a:chOff x="0" y="0"/>
-          <a:chExt cx="0" cy="0"/>
-        </a:xfrm>
-      </p:grpSpPr>
-      <p:sp>
-        <p:nvSpPr>
-          <p:cNvPr id="2" name="Slide Image Placeholder 1"/>
-          <p:cNvSpPr>
-            <a:spLocks noGrp="1" noRot="1" noChangeAspect="1"/>
-          </p:cNvSpPr>
-          <p:nvPr>
-            <p:ph type="sldImg"/>
-          </p:nvPr>
-        </p:nvSpPr>
-        <p:spPr/>
-      </p:sp>
-      <p:sp>
-        <p:nvSpPr>
-          <p:cNvPr id="3" name="Notes Placeholder 2"/>
-          <p:cNvSpPr>
-            <a:spLocks noGrp="1"/>
-          </p:cNvSpPr>
-          <p:nvPr>
-            <p:ph type="body" idx="1"/>
-          </p:nvPr>
-        </p:nvSpPr>
-        <p:spPr/>
-        <p:txBody>
-          <a:bodyPr/>
-          <a:lstStyle/>
-          <a:p>
-            <a:endParaRPr lang="en-US" dirty="0"/>
-          </a:p>
-        </p:txBody>
-      </p:sp>
-      <p:sp>
-        <p:nvSpPr>
-          <p:cNvPr id="4" name="Slide Number Placeholder 3"/>
-          <p:cNvSpPr>
-            <a:spLocks noGrp="1"/>
-          </p:cNvSpPr>
-          <p:nvPr>
-            <p:ph type="sldNum" sz="quarter" idx="10"/>
-          </p:nvPr>
-        </p:nvSpPr>
-        <p:spPr/>
-        <p:txBody>
-          <a:bodyPr/>
-          <a:lstStyle/>
-          <a:p>
-            <a:fld id="{3877ED68-86E3-4401-8F08-C0811F8F482B}" type="slidenum">
-              <a:rPr lang="en-US" smtClean="0"/>
-              <a:t>7</a:t>
-            </a:fld>
-            <a:endParaRPr lang="en-US"/>
-          </a:p>
-        </p:txBody>
-      </p:sp>
-    </p:spTree>
-    <p:extLst>
-      <p:ext uri="{BB962C8B-B14F-4D97-AF65-F5344CB8AC3E}">
-        <p14:creationId xmlns:p14="http://schemas.microsoft.com/office/powerpoint/2010/main" val="1153826949"/>
-      </p:ext>
-    </p:extLst>
-  </p:cSld>
-  <p:clrMapOvr>
-    <a:masterClrMapping/>
-  </p:clrMapOvr>
-</p:notes>
-</file>
-
 <file path=ppt/slideLayouts/slideLayout1.xml><?xml version="1.0" encoding="utf-8"?>
 <p:sldLayout xmlns:a="http://schemas.openxmlformats.org/drawingml/2006/main" xmlns:r="http://schemas.openxmlformats.org/officeDocument/2006/relationships" xmlns:p="http://schemas.openxmlformats.org/presentationml/2006/main" showMasterSp="0" type="title" preserve="1">
   <p:cSld name="Title Slide">
@@ -802,7 +710,7 @@
           <a:p>
             <a:fld id="{BA23EE8D-9CE0-4F42-A40F-E28604EA7175}" type="datetime1">
               <a:rPr lang="en-US" smtClean="0"/>
-              <a:t>1/6/2019</a:t>
+              <a:t>1/8/2019</a:t>
             </a:fld>
             <a:endParaRPr lang="en-US"/>
           </a:p>
@@ -989,7 +897,7 @@
           <a:p>
             <a:fld id="{C602C5EE-1F52-440A-B21D-CF34717184B1}" type="datetime1">
               <a:rPr lang="en-US" smtClean="0"/>
-              <a:t>1/6/2019</a:t>
+              <a:t>1/8/2019</a:t>
             </a:fld>
             <a:endParaRPr lang="en-US"/>
           </a:p>
@@ -1185,7 +1093,7 @@
           <a:p>
             <a:fld id="{88EA7AC3-3927-460F-BC0A-B8263F635273}" type="datetime1">
               <a:rPr lang="en-US" smtClean="0"/>
-              <a:t>1/6/2019</a:t>
+              <a:t>1/8/2019</a:t>
             </a:fld>
             <a:endParaRPr lang="en-US"/>
           </a:p>
@@ -1437,7 +1345,7 @@
           <a:p>
             <a:fld id="{F134B72F-0B71-4FD2-BD20-28F3E78BBA16}" type="datetime1">
               <a:rPr lang="en-US" smtClean="0"/>
-              <a:t>1/6/2019</a:t>
+              <a:t>1/8/2019</a:t>
             </a:fld>
             <a:endParaRPr lang="en-US"/>
           </a:p>
@@ -1661,7 +1569,7 @@
           <a:p>
             <a:fld id="{E47B1B4E-0EC6-4546-B26A-C4455998E44E}" type="datetime1">
               <a:rPr lang="en-US" smtClean="0"/>
-              <a:t>1/6/2019</a:t>
+              <a:t>1/8/2019</a:t>
             </a:fld>
             <a:endParaRPr lang="en-US"/>
           </a:p>
@@ -1969,7 +1877,7 @@
           <a:p>
             <a:fld id="{C3A8C74C-0B69-4161-99E9-DF9818443EAA}" type="datetime1">
               <a:rPr lang="en-US" smtClean="0"/>
-              <a:t>1/6/2019</a:t>
+              <a:t>1/8/2019</a:t>
             </a:fld>
             <a:endParaRPr lang="en-US"/>
           </a:p>
@@ -2137,7 +2045,7 @@
           <a:p>
             <a:fld id="{4DFBF3A0-C444-4F34-BF5B-169E9D461035}" type="datetime1">
               <a:rPr lang="en-US" smtClean="0"/>
-              <a:t>1/6/2019</a:t>
+              <a:t>1/8/2019</a:t>
             </a:fld>
             <a:endParaRPr lang="en-US"/>
           </a:p>
@@ -2449,7 +2357,7 @@
           <a:p>
             <a:fld id="{E196B420-BADE-4187-9E75-E64276466004}" type="datetime1">
               <a:rPr lang="en-US" smtClean="0"/>
-              <a:t>1/6/2019</a:t>
+              <a:t>1/8/2019</a:t>
             </a:fld>
             <a:endParaRPr lang="en-US"/>
           </a:p>
@@ -2761,7 +2669,7 @@
           <a:p>
             <a:fld id="{FF00C915-A483-44DD-9703-2D268BDAA475}" type="datetime1">
               <a:rPr lang="en-US" smtClean="0"/>
-              <a:t>1/6/2019</a:t>
+              <a:t>1/8/2019</a:t>
             </a:fld>
             <a:endParaRPr lang="en-US"/>
           </a:p>
@@ -2947,7 +2855,7 @@
           <a:p>
             <a:fld id="{1A4DAFB5-4EEC-49BD-AB33-559CD6F558E3}" type="datetime1">
               <a:rPr lang="en-US" smtClean="0"/>
-              <a:t>1/6/2019</a:t>
+              <a:t>1/8/2019</a:t>
             </a:fld>
             <a:endParaRPr lang="en-US"/>
           </a:p>
@@ -3156,7 +3064,7 @@
           <a:p>
             <a:fld id="{1EE2056D-DC17-4607-87F9-EA4937BD48E2}" type="datetime1">
               <a:rPr lang="en-US" smtClean="0"/>
-              <a:t>1/6/2019</a:t>
+              <a:t>1/8/2019</a:t>
             </a:fld>
             <a:endParaRPr lang="en-US"/>
           </a:p>
@@ -3459,7 +3367,7 @@
           <a:p>
             <a:fld id="{866E3DAD-9254-43DE-A1F3-F1D56B1E5B5F}" type="datetime1">
               <a:rPr lang="en-US" smtClean="0"/>
-              <a:t>1/6/2019</a:t>
+              <a:t>1/8/2019</a:t>
             </a:fld>
             <a:endParaRPr lang="en-US"/>
           </a:p>
@@ -3901,7 +3809,7 @@
           <a:p>
             <a:fld id="{12F88D45-78A7-46A0-99B7-2046E351D366}" type="datetime1">
               <a:rPr lang="en-US" smtClean="0"/>
-              <a:t>1/6/2019</a:t>
+              <a:t>1/8/2019</a:t>
             </a:fld>
             <a:endParaRPr lang="en-US"/>
           </a:p>
@@ -4036,7 +3944,7 @@
           <a:p>
             <a:fld id="{7716AC84-6778-466F-95F9-3EEE8E306ABF}" type="datetime1">
               <a:rPr lang="en-US" smtClean="0"/>
-              <a:t>1/6/2019</a:t>
+              <a:t>1/8/2019</a:t>
             </a:fld>
             <a:endParaRPr lang="en-US"/>
           </a:p>
@@ -4149,7 +4057,7 @@
           <a:p>
             <a:fld id="{02DEDAFE-CBEF-41E8-868F-E40C867A5636}" type="datetime1">
               <a:rPr lang="en-US" smtClean="0"/>
-              <a:t>1/6/2019</a:t>
+              <a:t>1/8/2019</a:t>
             </a:fld>
             <a:endParaRPr lang="en-US"/>
           </a:p>
@@ -4442,7 +4350,7 @@
           <a:p>
             <a:fld id="{20C87E4D-F358-4436-A283-114607D95274}" type="datetime1">
               <a:rPr lang="en-US" smtClean="0"/>
-              <a:t>1/6/2019</a:t>
+              <a:t>1/8/2019</a:t>
             </a:fld>
             <a:endParaRPr lang="en-US"/>
           </a:p>
@@ -4716,7 +4624,7 @@
           <a:p>
             <a:fld id="{6CCABA82-8A7B-4924-987B-0B7221667B17}" type="datetime1">
               <a:rPr lang="en-US" smtClean="0"/>
-              <a:t>1/6/2019</a:t>
+              <a:t>1/8/2019</a:t>
             </a:fld>
             <a:endParaRPr lang="en-US"/>
           </a:p>
@@ -5010,7 +4918,7 @@
           <a:p>
             <a:fld id="{A7853F80-D63E-429F-B326-B00475E1D8E8}" type="datetime1">
               <a:rPr lang="en-US" smtClean="0"/>
-              <a:t>1/6/2019</a:t>
+              <a:t>1/8/2019</a:t>
             </a:fld>
             <a:endParaRPr lang="en-US"/>
           </a:p>
@@ -5703,7 +5611,13 @@
       </p:grpSpPr>
       <p:sp>
         <p:nvSpPr>
-          <p:cNvPr id="2" name="Title 1"/>
+          <p:cNvPr id="2" name="Title 1">
+            <a:extLst>
+              <a:ext uri="{FF2B5EF4-FFF2-40B4-BE49-F238E27FC236}">
+                <a16:creationId xmlns="" xmlns:a16="http://schemas.microsoft.com/office/drawing/2014/main" id="{4819A39B-28BB-4873-9914-8FEE18891DD4}"/>
+              </a:ext>
+            </a:extLst>
+          </p:cNvPr>
           <p:cNvSpPr>
             <a:spLocks noGrp="1"/>
           </p:cNvSpPr>
@@ -5713,35 +5627,28 @@
         </p:nvSpPr>
         <p:spPr/>
         <p:txBody>
-          <a:bodyPr/>
+          <a:bodyPr>
+            <a:normAutofit/>
+          </a:bodyPr>
           <a:lstStyle/>
           <a:p>
             <a:r>
-              <a:rPr lang="en-US" dirty="0"/>
-              <a:t>Course introduction</a:t>
-            </a:r>
-            <a:br>
-              <a:rPr lang="en-US" dirty="0"/>
-            </a:br>
-            <a:r>
-              <a:rPr lang="en-US" sz="3200" dirty="0" smtClean="0"/>
-              <a:t>14 </a:t>
-            </a:r>
-            <a:r>
-              <a:rPr lang="en-US" sz="3200" dirty="0"/>
-              <a:t>January </a:t>
-            </a:r>
-            <a:r>
-              <a:rPr lang="en-US" sz="3200" dirty="0" smtClean="0"/>
-              <a:t>2019</a:t>
-            </a:r>
-            <a:endParaRPr lang="en-US" sz="3200" dirty="0"/>
-          </a:p>
-        </p:txBody>
-      </p:sp>
-      <p:sp>
-        <p:nvSpPr>
-          <p:cNvPr id="5" name="Subtitle 2"/>
+              <a:rPr lang="es-ES" dirty="0" smtClean="0"/>
+              <a:t>Introducción del curso</a:t>
+            </a:r>
+            <a:endParaRPr lang="es-CL" noProof="0" dirty="0"/>
+          </a:p>
+        </p:txBody>
+      </p:sp>
+      <p:sp>
+        <p:nvSpPr>
+          <p:cNvPr id="5" name="Subtitle 2">
+            <a:extLst>
+              <a:ext uri="{FF2B5EF4-FFF2-40B4-BE49-F238E27FC236}">
+                <a16:creationId xmlns="" xmlns:a16="http://schemas.microsoft.com/office/drawing/2014/main" id="{2BECD79D-0B3A-44C2-A155-03EC2A6A5D3B}"/>
+              </a:ext>
+            </a:extLst>
+          </p:cNvPr>
           <p:cNvSpPr txBox="1">
             <a:spLocks/>
           </p:cNvSpPr>
@@ -5749,8 +5656,8 @@
         </p:nvSpPr>
         <p:spPr bwMode="auto">
           <a:xfrm>
-            <a:off x="914399" y="3962400"/>
-            <a:ext cx="7799631" cy="1752600"/>
+            <a:off x="528916" y="4378888"/>
+            <a:ext cx="8008659" cy="1752600"/>
           </a:xfrm>
           <a:prstGeom prst="rect">
             <a:avLst/>
@@ -5977,1050 +5884,60 @@
             </a:lvl9pPr>
           </a:lstStyle>
           <a:p>
-            <a:r>
-              <a:rPr lang="en-US" dirty="0"/>
-              <a:t>Fitting hierarchical models with TMB</a:t>
-            </a:r>
-          </a:p>
-          <a:p>
-            <a:r>
-              <a:rPr lang="en-US" dirty="0" smtClean="0"/>
-              <a:t>14-18 </a:t>
-            </a:r>
-            <a:r>
-              <a:rPr lang="en-US" dirty="0" err="1" smtClean="0"/>
+            <a:pPr defTabSz="914400"/>
+            <a:r>
+              <a:rPr lang="es-ES" kern="0" dirty="0"/>
+              <a:t>Modelos Bayesianos con aplicaciones </a:t>
+            </a:r>
+            <a:r>
+              <a:rPr lang="es-ES" kern="0" dirty="0" smtClean="0"/>
+              <a:t>ecológicas</a:t>
+            </a:r>
+          </a:p>
+          <a:p>
+            <a:pPr defTabSz="914400"/>
+            <a:r>
+              <a:rPr lang="en-US" kern="0" dirty="0"/>
+              <a:t>Dr. Cole Monnahan</a:t>
+            </a:r>
+          </a:p>
+          <a:p>
+            <a:pPr defTabSz="914400"/>
+            <a:r>
+              <a:rPr lang="en-US" kern="0" dirty="0" smtClean="0"/>
+              <a:t>University </a:t>
+            </a:r>
+            <a:r>
+              <a:rPr lang="en-US" kern="0" dirty="0"/>
+              <a:t>of Concepción, </a:t>
+            </a:r>
+            <a:r>
+              <a:rPr lang="en-US" kern="0" dirty="0" smtClean="0"/>
+              <a:t>Chile</a:t>
+            </a:r>
+          </a:p>
+          <a:p>
+            <a:pPr defTabSz="914400"/>
+            <a:r>
+              <a:rPr lang="en-US" kern="0" dirty="0" err="1"/>
               <a:t>Enero</a:t>
             </a:r>
             <a:r>
-              <a:rPr lang="en-US" dirty="0" smtClean="0"/>
-              <a:t>, 2019</a:t>
-            </a:r>
-            <a:endParaRPr lang="en-US" dirty="0"/>
-          </a:p>
-          <a:p>
-            <a:r>
-              <a:rPr lang="en-US" dirty="0" smtClean="0"/>
-              <a:t>Universidad de </a:t>
-            </a:r>
-            <a:r>
-              <a:rPr lang="en-US" dirty="0"/>
-              <a:t>Concepción, Chile</a:t>
-            </a:r>
-          </a:p>
-          <a:p>
-            <a:r>
-              <a:rPr lang="en-US" dirty="0"/>
-              <a:t>Dr. Cole </a:t>
-            </a:r>
-            <a:r>
-              <a:rPr lang="en-US" dirty="0" err="1"/>
-              <a:t>Monnahan</a:t>
-            </a:r>
-            <a:r>
-              <a:rPr lang="en-US" dirty="0"/>
-              <a:t> </a:t>
-            </a:r>
-          </a:p>
-        </p:txBody>
-      </p:sp>
-      <p:sp>
-        <p:nvSpPr>
-          <p:cNvPr id="3" name="Slide Number Placeholder 2">
-            <a:extLst>
-              <a:ext uri="{FF2B5EF4-FFF2-40B4-BE49-F238E27FC236}">
-                <a16:creationId xmlns:a16="http://schemas.microsoft.com/office/drawing/2014/main" xmlns="" id="{04ED0606-C25E-409A-965C-0628E2CEB687}"/>
-              </a:ext>
-            </a:extLst>
-          </p:cNvPr>
-          <p:cNvSpPr>
-            <a:spLocks noGrp="1"/>
-          </p:cNvSpPr>
-          <p:nvPr>
-            <p:ph type="sldNum" sz="quarter" idx="12"/>
-          </p:nvPr>
-        </p:nvSpPr>
-        <p:spPr/>
-        <p:txBody>
-          <a:bodyPr/>
-          <a:lstStyle/>
-          <a:p>
-            <a:fld id="{A90099C9-4CB8-9A40-B745-9AB270505907}" type="slidenum">
-              <a:rPr lang="en-US" smtClean="0"/>
-              <a:t>1</a:t>
-            </a:fld>
-            <a:endParaRPr lang="en-US"/>
+              <a:rPr lang="en-US" kern="0" dirty="0"/>
+              <a:t>, </a:t>
+            </a:r>
+            <a:r>
+              <a:rPr lang="en-US" kern="0" dirty="0" smtClean="0"/>
+              <a:t>2018</a:t>
+            </a:r>
+            <a:endParaRPr lang="en-US" kern="0" dirty="0"/>
           </a:p>
         </p:txBody>
       </p:sp>
     </p:spTree>
     <p:extLst>
       <p:ext uri="{BB962C8B-B14F-4D97-AF65-F5344CB8AC3E}">
-        <p14:creationId xmlns:p14="http://schemas.microsoft.com/office/powerpoint/2010/main" val="1247226098"/>
-      </p:ext>
-    </p:extLst>
-  </p:cSld>
-  <p:clrMapOvr>
-    <a:masterClrMapping/>
-  </p:clrMapOvr>
-</p:sld>
-</file>
-
-<file path=ppt/slides/slide10.xml><?xml version="1.0" encoding="utf-8"?>
-<p:sld xmlns:a="http://schemas.openxmlformats.org/drawingml/2006/main" xmlns:r="http://schemas.openxmlformats.org/officeDocument/2006/relationships" xmlns:p="http://schemas.openxmlformats.org/presentationml/2006/main">
-  <p:cSld>
-    <p:spTree>
-      <p:nvGrpSpPr>
-        <p:cNvPr id="1" name=""/>
-        <p:cNvGrpSpPr/>
-        <p:nvPr/>
-      </p:nvGrpSpPr>
-      <p:grpSpPr>
-        <a:xfrm>
-          <a:off x="0" y="0"/>
-          <a:ext cx="0" cy="0"/>
-          <a:chOff x="0" y="0"/>
-          <a:chExt cx="0" cy="0"/>
-        </a:xfrm>
-      </p:grpSpPr>
-      <p:sp>
-        <p:nvSpPr>
-          <p:cNvPr id="2" name="Title 1"/>
-          <p:cNvSpPr>
-            <a:spLocks noGrp="1"/>
-          </p:cNvSpPr>
-          <p:nvPr>
-            <p:ph type="title"/>
-          </p:nvPr>
-        </p:nvSpPr>
-        <p:spPr/>
-        <p:txBody>
-          <a:bodyPr/>
-          <a:lstStyle/>
-          <a:p>
-            <a:endParaRPr lang="en-US"/>
-          </a:p>
-        </p:txBody>
-      </p:sp>
-      <p:sp>
-        <p:nvSpPr>
-          <p:cNvPr id="3" name="Content Placeholder 2"/>
-          <p:cNvSpPr>
-            <a:spLocks noGrp="1"/>
-          </p:cNvSpPr>
-          <p:nvPr>
-            <p:ph idx="1"/>
-          </p:nvPr>
-        </p:nvSpPr>
-        <p:spPr/>
-        <p:txBody>
-          <a:bodyPr/>
-          <a:lstStyle/>
-          <a:p>
-            <a:r>
-              <a:rPr lang="en-US" dirty="0" smtClean="0"/>
-              <a:t>Table of frequentist vs Bayesian</a:t>
-            </a:r>
-            <a:endParaRPr lang="en-US" dirty="0"/>
-          </a:p>
-        </p:txBody>
-      </p:sp>
-      <p:sp>
-        <p:nvSpPr>
-          <p:cNvPr id="4" name="Slide Number Placeholder 3"/>
-          <p:cNvSpPr>
-            <a:spLocks noGrp="1"/>
-          </p:cNvSpPr>
-          <p:nvPr>
-            <p:ph type="sldNum" sz="quarter" idx="12"/>
-          </p:nvPr>
-        </p:nvSpPr>
-        <p:spPr/>
-        <p:txBody>
-          <a:bodyPr/>
-          <a:lstStyle/>
-          <a:p>
-            <a:fld id="{A90099C9-4CB8-9A40-B745-9AB270505907}" type="slidenum">
-              <a:rPr lang="en-US" smtClean="0"/>
-              <a:t>10</a:t>
-            </a:fld>
-            <a:endParaRPr lang="en-US"/>
-          </a:p>
-        </p:txBody>
-      </p:sp>
-    </p:spTree>
-    <p:extLst>
-      <p:ext uri="{BB962C8B-B14F-4D97-AF65-F5344CB8AC3E}">
-        <p14:creationId xmlns:p14="http://schemas.microsoft.com/office/powerpoint/2010/main" val="3385748645"/>
-      </p:ext>
-    </p:extLst>
-  </p:cSld>
-  <p:clrMapOvr>
-    <a:masterClrMapping/>
-  </p:clrMapOvr>
-</p:sld>
-</file>
-
-<file path=ppt/slides/slide11.xml><?xml version="1.0" encoding="utf-8"?>
-<p:sld xmlns:a="http://schemas.openxmlformats.org/drawingml/2006/main" xmlns:r="http://schemas.openxmlformats.org/officeDocument/2006/relationships" xmlns:p="http://schemas.openxmlformats.org/presentationml/2006/main">
-  <p:cSld>
-    <p:spTree>
-      <p:nvGrpSpPr>
-        <p:cNvPr id="1" name=""/>
-        <p:cNvGrpSpPr/>
-        <p:nvPr/>
-      </p:nvGrpSpPr>
-      <p:grpSpPr>
-        <a:xfrm>
-          <a:off x="0" y="0"/>
-          <a:ext cx="0" cy="0"/>
-          <a:chOff x="0" y="0"/>
-          <a:chExt cx="0" cy="0"/>
-        </a:xfrm>
-      </p:grpSpPr>
-      <p:sp>
-        <p:nvSpPr>
-          <p:cNvPr id="2" name="Title 1">
-            <a:extLst>
-              <a:ext uri="{FF2B5EF4-FFF2-40B4-BE49-F238E27FC236}">
-                <a16:creationId xmlns:a16="http://schemas.microsoft.com/office/drawing/2014/main" xmlns="" id="{CB0E6FDE-94F6-4902-8005-C732DD0731D3}"/>
-              </a:ext>
-            </a:extLst>
-          </p:cNvPr>
-          <p:cNvSpPr>
-            <a:spLocks noGrp="1"/>
-          </p:cNvSpPr>
-          <p:nvPr>
-            <p:ph type="title"/>
-          </p:nvPr>
-        </p:nvSpPr>
-        <p:spPr/>
-        <p:txBody>
-          <a:bodyPr/>
-          <a:lstStyle/>
-          <a:p>
-            <a:r>
-              <a:rPr lang="en-US" dirty="0"/>
-              <a:t>Fitting </a:t>
-            </a:r>
-            <a:r>
-              <a:rPr lang="en-US" dirty="0" smtClean="0"/>
-              <a:t>Bayesian models</a:t>
-            </a:r>
-            <a:endParaRPr lang="en-US" dirty="0"/>
-          </a:p>
-        </p:txBody>
-      </p:sp>
-      <p:sp>
-        <p:nvSpPr>
-          <p:cNvPr id="3" name="Content Placeholder 2">
-            <a:extLst>
-              <a:ext uri="{FF2B5EF4-FFF2-40B4-BE49-F238E27FC236}">
-                <a16:creationId xmlns:a16="http://schemas.microsoft.com/office/drawing/2014/main" xmlns="" id="{1DEFC263-3EFE-422A-81C4-46C08CE5F527}"/>
-              </a:ext>
-            </a:extLst>
-          </p:cNvPr>
-          <p:cNvSpPr>
-            <a:spLocks noGrp="1"/>
-          </p:cNvSpPr>
-          <p:nvPr>
-            <p:ph idx="1"/>
-          </p:nvPr>
-        </p:nvSpPr>
-        <p:spPr>
-          <a:xfrm>
-            <a:off x="457200" y="1163637"/>
-            <a:ext cx="8229600" cy="4530725"/>
-          </a:xfrm>
-        </p:spPr>
-        <p:txBody>
-          <a:bodyPr/>
-          <a:lstStyle/>
-          <a:p>
-            <a:r>
-              <a:rPr lang="en-US" sz="2800" dirty="0"/>
-              <a:t>Possible as either Bayesian or frequentist</a:t>
-            </a:r>
-          </a:p>
-          <a:p>
-            <a:endParaRPr lang="en-US" sz="2800" dirty="0"/>
-          </a:p>
-        </p:txBody>
-      </p:sp>
-      <p:sp>
-        <p:nvSpPr>
-          <p:cNvPr id="4" name="Slide Number Placeholder 3">
-            <a:extLst>
-              <a:ext uri="{FF2B5EF4-FFF2-40B4-BE49-F238E27FC236}">
-                <a16:creationId xmlns:a16="http://schemas.microsoft.com/office/drawing/2014/main" xmlns="" id="{8D97FE3E-4297-439A-81BC-9F3D8EAA401F}"/>
-              </a:ext>
-            </a:extLst>
-          </p:cNvPr>
-          <p:cNvSpPr>
-            <a:spLocks noGrp="1"/>
-          </p:cNvSpPr>
-          <p:nvPr>
-            <p:ph type="sldNum" sz="quarter" idx="12"/>
-          </p:nvPr>
-        </p:nvSpPr>
-        <p:spPr/>
-        <p:txBody>
-          <a:bodyPr/>
-          <a:lstStyle/>
-          <a:p>
-            <a:fld id="{A90099C9-4CB8-9A40-B745-9AB270505907}" type="slidenum">
-              <a:rPr lang="en-US" smtClean="0"/>
-              <a:t>11</a:t>
-            </a:fld>
-            <a:endParaRPr lang="en-US"/>
-          </a:p>
-        </p:txBody>
-      </p:sp>
-    </p:spTree>
-    <p:extLst>
-      <p:ext uri="{BB962C8B-B14F-4D97-AF65-F5344CB8AC3E}">
-        <p14:creationId xmlns:p14="http://schemas.microsoft.com/office/powerpoint/2010/main" val="3482696858"/>
-      </p:ext>
-    </p:extLst>
-  </p:cSld>
-  <p:clrMapOvr>
-    <a:masterClrMapping/>
-  </p:clrMapOvr>
-</p:sld>
-</file>
-
-<file path=ppt/slides/slide12.xml><?xml version="1.0" encoding="utf-8"?>
-<p:sld xmlns:a="http://schemas.openxmlformats.org/drawingml/2006/main" xmlns:r="http://schemas.openxmlformats.org/officeDocument/2006/relationships" xmlns:p="http://schemas.openxmlformats.org/presentationml/2006/main">
-  <p:cSld>
-    <p:spTree>
-      <p:nvGrpSpPr>
-        <p:cNvPr id="1" name=""/>
-        <p:cNvGrpSpPr/>
-        <p:nvPr/>
-      </p:nvGrpSpPr>
-      <p:grpSpPr>
-        <a:xfrm>
-          <a:off x="0" y="0"/>
-          <a:ext cx="0" cy="0"/>
-          <a:chOff x="0" y="0"/>
-          <a:chExt cx="0" cy="0"/>
-        </a:xfrm>
-      </p:grpSpPr>
-      <p:sp>
-        <p:nvSpPr>
-          <p:cNvPr id="2" name="Title 1">
-            <a:extLst>
-              <a:ext uri="{FF2B5EF4-FFF2-40B4-BE49-F238E27FC236}">
-                <a16:creationId xmlns:a16="http://schemas.microsoft.com/office/drawing/2014/main" xmlns="" id="{E739D98F-71DF-443D-9C53-238EFEE97DDB}"/>
-              </a:ext>
-            </a:extLst>
-          </p:cNvPr>
-          <p:cNvSpPr>
-            <a:spLocks noGrp="1"/>
-          </p:cNvSpPr>
-          <p:nvPr>
-            <p:ph type="title"/>
-          </p:nvPr>
-        </p:nvSpPr>
-        <p:spPr>
-          <a:xfrm>
-            <a:off x="628650" y="265482"/>
-            <a:ext cx="7886700" cy="1325563"/>
-          </a:xfrm>
-        </p:spPr>
-        <p:txBody>
-          <a:bodyPr/>
-          <a:lstStyle/>
-          <a:p>
-            <a:r>
-              <a:rPr lang="en-US" dirty="0"/>
-              <a:t>What is </a:t>
-            </a:r>
-            <a:r>
-              <a:rPr lang="en-US" dirty="0" smtClean="0"/>
-              <a:t>JAGS?</a:t>
-            </a:r>
-            <a:endParaRPr lang="en-US" dirty="0"/>
-          </a:p>
-        </p:txBody>
-      </p:sp>
-      <p:sp>
-        <p:nvSpPr>
-          <p:cNvPr id="3" name="Content Placeholder 2">
-            <a:extLst>
-              <a:ext uri="{FF2B5EF4-FFF2-40B4-BE49-F238E27FC236}">
-                <a16:creationId xmlns:a16="http://schemas.microsoft.com/office/drawing/2014/main" xmlns="" id="{72EE2A39-0FF6-495E-9142-EB0FBF0E5DE6}"/>
-              </a:ext>
-            </a:extLst>
-          </p:cNvPr>
-          <p:cNvSpPr>
-            <a:spLocks noGrp="1"/>
-          </p:cNvSpPr>
-          <p:nvPr>
-            <p:ph idx="1"/>
-          </p:nvPr>
-        </p:nvSpPr>
-        <p:spPr>
-          <a:xfrm>
-            <a:off x="455394" y="1195666"/>
-            <a:ext cx="7886700" cy="5020209"/>
-          </a:xfrm>
-        </p:spPr>
-        <p:txBody>
-          <a:bodyPr>
-            <a:normAutofit/>
-          </a:bodyPr>
-          <a:lstStyle/>
-          <a:p>
-            <a:r>
-              <a:rPr lang="en-US" dirty="0"/>
-              <a:t>TMB is an R package and environment for fitting statistical </a:t>
-            </a:r>
-            <a:r>
-              <a:rPr lang="en-US" dirty="0" smtClean="0"/>
-              <a:t>models</a:t>
-            </a:r>
-            <a:endParaRPr lang="en-US" dirty="0"/>
-          </a:p>
-        </p:txBody>
-      </p:sp>
-      <p:sp>
-        <p:nvSpPr>
-          <p:cNvPr id="7" name="Slide Number Placeholder 6">
-            <a:extLst>
-              <a:ext uri="{FF2B5EF4-FFF2-40B4-BE49-F238E27FC236}">
-                <a16:creationId xmlns:a16="http://schemas.microsoft.com/office/drawing/2014/main" xmlns="" id="{38DCC833-7A21-4398-977F-F8C65EDCB720}"/>
-              </a:ext>
-            </a:extLst>
-          </p:cNvPr>
-          <p:cNvSpPr>
-            <a:spLocks noGrp="1"/>
-          </p:cNvSpPr>
-          <p:nvPr>
-            <p:ph type="sldNum" sz="quarter" idx="12"/>
-          </p:nvPr>
-        </p:nvSpPr>
-        <p:spPr/>
-        <p:txBody>
-          <a:bodyPr/>
-          <a:lstStyle/>
-          <a:p>
-            <a:fld id="{A90099C9-4CB8-9A40-B745-9AB270505907}" type="slidenum">
-              <a:rPr lang="en-US" smtClean="0"/>
-              <a:t>12</a:t>
-            </a:fld>
-            <a:endParaRPr lang="en-US"/>
-          </a:p>
-        </p:txBody>
-      </p:sp>
-    </p:spTree>
-    <p:extLst>
-      <p:ext uri="{BB962C8B-B14F-4D97-AF65-F5344CB8AC3E}">
-        <p14:creationId xmlns:p14="http://schemas.microsoft.com/office/powerpoint/2010/main" val="54894090"/>
-      </p:ext>
-    </p:extLst>
-  </p:cSld>
-  <p:clrMapOvr>
-    <a:masterClrMapping/>
-  </p:clrMapOvr>
-  <p:timing>
-    <p:tnLst>
-      <p:par>
-        <p:cTn id="1" dur="indefinite" restart="never" nodeType="tmRoot"/>
-      </p:par>
-    </p:tnLst>
-  </p:timing>
-</p:sld>
-</file>
-
-<file path=ppt/slides/slide13.xml><?xml version="1.0" encoding="utf-8"?>
-<p:sld xmlns:a="http://schemas.openxmlformats.org/drawingml/2006/main" xmlns:r="http://schemas.openxmlformats.org/officeDocument/2006/relationships" xmlns:p="http://schemas.openxmlformats.org/presentationml/2006/main">
-  <p:cSld>
-    <p:spTree>
-      <p:nvGrpSpPr>
-        <p:cNvPr id="1" name=""/>
-        <p:cNvGrpSpPr/>
-        <p:nvPr/>
-      </p:nvGrpSpPr>
-      <p:grpSpPr>
-        <a:xfrm>
-          <a:off x="0" y="0"/>
-          <a:ext cx="0" cy="0"/>
-          <a:chOff x="0" y="0"/>
-          <a:chExt cx="0" cy="0"/>
-        </a:xfrm>
-      </p:grpSpPr>
-      <p:sp>
-        <p:nvSpPr>
-          <p:cNvPr id="2" name="Title 1">
-            <a:extLst>
-              <a:ext uri="{FF2B5EF4-FFF2-40B4-BE49-F238E27FC236}">
-                <a16:creationId xmlns:a16="http://schemas.microsoft.com/office/drawing/2014/main" xmlns="" id="{5EB8122A-E5D5-40DB-9C80-BBCB3BBDECD7}"/>
-              </a:ext>
-            </a:extLst>
-          </p:cNvPr>
-          <p:cNvSpPr>
-            <a:spLocks noGrp="1"/>
-          </p:cNvSpPr>
-          <p:nvPr>
-            <p:ph type="title"/>
-          </p:nvPr>
-        </p:nvSpPr>
-        <p:spPr>
-          <a:xfrm>
-            <a:off x="628650" y="365126"/>
-            <a:ext cx="7886700" cy="1325563"/>
-          </a:xfrm>
-        </p:spPr>
-        <p:txBody>
-          <a:bodyPr/>
-          <a:lstStyle/>
-          <a:p>
-            <a:r>
-              <a:rPr lang="en-US"/>
-              <a:t>TMB Workflow Overview</a:t>
-            </a:r>
-            <a:endParaRPr lang="en-US" dirty="0"/>
-          </a:p>
-        </p:txBody>
-      </p:sp>
-      <p:sp>
-        <p:nvSpPr>
-          <p:cNvPr id="3" name="Content Placeholder 2">
-            <a:extLst>
-              <a:ext uri="{FF2B5EF4-FFF2-40B4-BE49-F238E27FC236}">
-                <a16:creationId xmlns:a16="http://schemas.microsoft.com/office/drawing/2014/main" xmlns="" id="{547B9D8F-0982-4A94-B47A-F28857104C64}"/>
-              </a:ext>
-            </a:extLst>
-          </p:cNvPr>
-          <p:cNvSpPr>
-            <a:spLocks noGrp="1"/>
-          </p:cNvSpPr>
-          <p:nvPr>
-            <p:ph idx="1"/>
-          </p:nvPr>
-        </p:nvSpPr>
-        <p:spPr/>
-        <p:txBody>
-          <a:bodyPr/>
-          <a:lstStyle/>
-          <a:p>
-            <a:pPr marL="514350" indent="-514350">
-              <a:buFont typeface="+mj-lt"/>
-              <a:buAutoNum type="arabicPeriod"/>
-            </a:pPr>
-            <a:r>
-              <a:rPr lang="en-US" sz="2800" dirty="0"/>
-              <a:t>Postulate a statistical model</a:t>
-            </a:r>
-          </a:p>
-          <a:p>
-            <a:pPr marL="514350" indent="-514350">
-              <a:buFont typeface="+mj-lt"/>
-              <a:buAutoNum type="arabicPeriod"/>
-            </a:pPr>
-            <a:r>
-              <a:rPr lang="en-US" sz="2800" dirty="0"/>
-              <a:t>Write a C++ template file to calculate the negative log-likelihood given parameters</a:t>
-            </a:r>
-          </a:p>
-          <a:p>
-            <a:pPr marL="514350" indent="-514350">
-              <a:buFont typeface="+mj-lt"/>
-              <a:buAutoNum type="arabicPeriod"/>
-            </a:pPr>
-            <a:r>
-              <a:rPr lang="en-US" sz="2800" dirty="0"/>
-              <a:t>Compile the model and link to it in R</a:t>
-            </a:r>
-          </a:p>
-          <a:p>
-            <a:pPr marL="514350" indent="-514350">
-              <a:buFont typeface="+mj-lt"/>
-              <a:buAutoNum type="arabicPeriod"/>
-            </a:pPr>
-            <a:r>
-              <a:rPr lang="en-US" sz="2800" dirty="0"/>
-              <a:t>Declare which parameters are “random”</a:t>
-            </a:r>
-          </a:p>
-          <a:p>
-            <a:pPr marL="514350" indent="-514350">
-              <a:buFont typeface="+mj-lt"/>
-              <a:buAutoNum type="arabicPeriod"/>
-            </a:pPr>
-            <a:r>
-              <a:rPr lang="en-US" sz="2800" dirty="0"/>
-              <a:t>Fit model using R minimizer and the </a:t>
-            </a:r>
-            <a:r>
-              <a:rPr lang="en-US" sz="2800" i="1" dirty="0"/>
-              <a:t>objective</a:t>
-            </a:r>
-            <a:r>
-              <a:rPr lang="en-US" sz="2800" dirty="0"/>
-              <a:t> and </a:t>
-            </a:r>
-            <a:r>
-              <a:rPr lang="en-US" sz="2800" i="1" dirty="0"/>
-              <a:t>gradient</a:t>
-            </a:r>
-            <a:r>
-              <a:rPr lang="en-US" sz="2800" dirty="0"/>
-              <a:t> functions returned by TMB</a:t>
-            </a:r>
-          </a:p>
-          <a:p>
-            <a:pPr marL="514350" indent="-514350">
-              <a:buFont typeface="+mj-lt"/>
-              <a:buAutoNum type="arabicPeriod"/>
-            </a:pPr>
-            <a:r>
-              <a:rPr lang="en-US" sz="2800" dirty="0"/>
-              <a:t>Make inference from the maximum likelihood</a:t>
-            </a:r>
-          </a:p>
-        </p:txBody>
-      </p:sp>
-      <p:sp>
-        <p:nvSpPr>
-          <p:cNvPr id="4" name="Slide Number Placeholder 3">
-            <a:extLst>
-              <a:ext uri="{FF2B5EF4-FFF2-40B4-BE49-F238E27FC236}">
-                <a16:creationId xmlns:a16="http://schemas.microsoft.com/office/drawing/2014/main" xmlns="" id="{714B846A-2D9A-45BD-94E4-9687193405CD}"/>
-              </a:ext>
-            </a:extLst>
-          </p:cNvPr>
-          <p:cNvSpPr>
-            <a:spLocks noGrp="1"/>
-          </p:cNvSpPr>
-          <p:nvPr>
-            <p:ph type="sldNum" sz="quarter" idx="12"/>
-          </p:nvPr>
-        </p:nvSpPr>
-        <p:spPr/>
-        <p:txBody>
-          <a:bodyPr/>
-          <a:lstStyle/>
-          <a:p>
-            <a:fld id="{A90099C9-4CB8-9A40-B745-9AB270505907}" type="slidenum">
-              <a:rPr lang="en-US" smtClean="0"/>
-              <a:t>13</a:t>
-            </a:fld>
-            <a:endParaRPr lang="en-US"/>
-          </a:p>
-        </p:txBody>
-      </p:sp>
-    </p:spTree>
-    <p:extLst>
-      <p:ext uri="{BB962C8B-B14F-4D97-AF65-F5344CB8AC3E}">
-        <p14:creationId xmlns:p14="http://schemas.microsoft.com/office/powerpoint/2010/main" val="4209561370"/>
-      </p:ext>
-    </p:extLst>
-  </p:cSld>
-  <p:clrMapOvr>
-    <a:masterClrMapping/>
-  </p:clrMapOvr>
-</p:sld>
-</file>
-
-<file path=ppt/slides/slide14.xml><?xml version="1.0" encoding="utf-8"?>
-<p:sld xmlns:a="http://schemas.openxmlformats.org/drawingml/2006/main" xmlns:r="http://schemas.openxmlformats.org/officeDocument/2006/relationships" xmlns:p="http://schemas.openxmlformats.org/presentationml/2006/main">
-  <p:cSld>
-    <p:spTree>
-      <p:nvGrpSpPr>
-        <p:cNvPr id="1" name=""/>
-        <p:cNvGrpSpPr/>
-        <p:nvPr/>
-      </p:nvGrpSpPr>
-      <p:grpSpPr>
-        <a:xfrm>
-          <a:off x="0" y="0"/>
-          <a:ext cx="0" cy="0"/>
-          <a:chOff x="0" y="0"/>
-          <a:chExt cx="0" cy="0"/>
-        </a:xfrm>
-      </p:grpSpPr>
-      <p:sp>
-        <p:nvSpPr>
-          <p:cNvPr id="2" name="Title 1">
-            <a:extLst>
-              <a:ext uri="{FF2B5EF4-FFF2-40B4-BE49-F238E27FC236}">
-                <a16:creationId xmlns:a16="http://schemas.microsoft.com/office/drawing/2014/main" xmlns="" id="{7913AC2B-63D1-41CF-8A4D-FE776415E490}"/>
-              </a:ext>
-            </a:extLst>
-          </p:cNvPr>
-          <p:cNvSpPr>
-            <a:spLocks noGrp="1"/>
-          </p:cNvSpPr>
-          <p:nvPr>
-            <p:ph type="title"/>
-          </p:nvPr>
-        </p:nvSpPr>
-        <p:spPr>
-          <a:xfrm>
-            <a:off x="484271" y="292608"/>
-            <a:ext cx="7886700" cy="1325563"/>
-          </a:xfrm>
-        </p:spPr>
-        <p:txBody>
-          <a:bodyPr/>
-          <a:lstStyle/>
-          <a:p>
-            <a:r>
-              <a:rPr lang="en-US" dirty="0"/>
-              <a:t>TMB examples</a:t>
-            </a:r>
-          </a:p>
-        </p:txBody>
-      </p:sp>
-      <p:sp>
-        <p:nvSpPr>
-          <p:cNvPr id="3" name="Content Placeholder 2">
-            <a:extLst>
-              <a:ext uri="{FF2B5EF4-FFF2-40B4-BE49-F238E27FC236}">
-                <a16:creationId xmlns:a16="http://schemas.microsoft.com/office/drawing/2014/main" xmlns="" id="{5A2CC061-4F0C-4A09-A281-9CEDAFCA2EAC}"/>
-              </a:ext>
-            </a:extLst>
-          </p:cNvPr>
-          <p:cNvSpPr>
-            <a:spLocks noGrp="1"/>
-          </p:cNvSpPr>
-          <p:nvPr>
-            <p:ph idx="1"/>
-          </p:nvPr>
-        </p:nvSpPr>
-        <p:spPr>
-          <a:xfrm>
-            <a:off x="259883" y="1203158"/>
-            <a:ext cx="8527982" cy="5654841"/>
-          </a:xfrm>
-        </p:spPr>
-        <p:txBody>
-          <a:bodyPr>
-            <a:normAutofit/>
-          </a:bodyPr>
-          <a:lstStyle/>
-          <a:p>
-            <a:r>
-              <a:rPr lang="en-US" sz="2000" u="sng" dirty="0"/>
-              <a:t>Spatial (geospatial)</a:t>
-            </a:r>
-          </a:p>
-          <a:p>
-            <a:pPr marL="457200" lvl="1" indent="0">
-              <a:buNone/>
-            </a:pPr>
-            <a:r>
-              <a:rPr lang="en-US" sz="1800" dirty="0"/>
-              <a:t>Thorson, James T., et al. "The importance of spatial models for estimating the strength of density dependence." </a:t>
-            </a:r>
-            <a:r>
-              <a:rPr lang="en-US" sz="1800" i="1" dirty="0"/>
-              <a:t>Ecology </a:t>
-            </a:r>
-            <a:r>
-              <a:rPr lang="en-US" sz="1800" dirty="0"/>
-              <a:t>96.5 (2015): 1202-1212.</a:t>
-            </a:r>
-          </a:p>
-          <a:p>
-            <a:pPr marL="0" indent="0">
-              <a:buNone/>
-            </a:pPr>
-            <a:endParaRPr lang="en-US" sz="1800" dirty="0"/>
-          </a:p>
-        </p:txBody>
-      </p:sp>
-      <p:sp>
-        <p:nvSpPr>
-          <p:cNvPr id="4" name="Slide Number Placeholder 3">
-            <a:extLst>
-              <a:ext uri="{FF2B5EF4-FFF2-40B4-BE49-F238E27FC236}">
-                <a16:creationId xmlns:a16="http://schemas.microsoft.com/office/drawing/2014/main" xmlns="" id="{DEC83832-5F8D-49D1-9F33-2F888FC73CE6}"/>
-              </a:ext>
-            </a:extLst>
-          </p:cNvPr>
-          <p:cNvSpPr>
-            <a:spLocks noGrp="1"/>
-          </p:cNvSpPr>
-          <p:nvPr>
-            <p:ph type="sldNum" sz="quarter" idx="12"/>
-          </p:nvPr>
-        </p:nvSpPr>
-        <p:spPr/>
-        <p:txBody>
-          <a:bodyPr/>
-          <a:lstStyle/>
-          <a:p>
-            <a:fld id="{A90099C9-4CB8-9A40-B745-9AB270505907}" type="slidenum">
-              <a:rPr lang="en-US" smtClean="0"/>
-              <a:t>14</a:t>
-            </a:fld>
-            <a:endParaRPr lang="en-US"/>
-          </a:p>
-        </p:txBody>
-      </p:sp>
-    </p:spTree>
-    <p:extLst>
-      <p:ext uri="{BB962C8B-B14F-4D97-AF65-F5344CB8AC3E}">
-        <p14:creationId xmlns:p14="http://schemas.microsoft.com/office/powerpoint/2010/main" val="4133765698"/>
-      </p:ext>
-    </p:extLst>
-  </p:cSld>
-  <p:clrMapOvr>
-    <a:masterClrMapping/>
-  </p:clrMapOvr>
-</p:sld>
-</file>
-
-<file path=ppt/slides/slide15.xml><?xml version="1.0" encoding="utf-8"?>
-<p:sld xmlns:a="http://schemas.openxmlformats.org/drawingml/2006/main" xmlns:r="http://schemas.openxmlformats.org/officeDocument/2006/relationships" xmlns:p="http://schemas.openxmlformats.org/presentationml/2006/main">
-  <p:cSld>
-    <p:spTree>
-      <p:nvGrpSpPr>
-        <p:cNvPr id="1" name=""/>
-        <p:cNvGrpSpPr/>
-        <p:nvPr/>
-      </p:nvGrpSpPr>
-      <p:grpSpPr>
-        <a:xfrm>
-          <a:off x="0" y="0"/>
-          <a:ext cx="0" cy="0"/>
-          <a:chOff x="0" y="0"/>
-          <a:chExt cx="0" cy="0"/>
-        </a:xfrm>
-      </p:grpSpPr>
-      <p:sp>
-        <p:nvSpPr>
-          <p:cNvPr id="2" name="Title 1">
-            <a:extLst>
-              <a:ext uri="{FF2B5EF4-FFF2-40B4-BE49-F238E27FC236}">
-                <a16:creationId xmlns:a16="http://schemas.microsoft.com/office/drawing/2014/main" xmlns="" id="{8573B90D-AA81-4638-8F89-08E6B5562A77}"/>
-              </a:ext>
-            </a:extLst>
-          </p:cNvPr>
-          <p:cNvSpPr>
-            <a:spLocks noGrp="1"/>
-          </p:cNvSpPr>
-          <p:nvPr>
-            <p:ph type="title"/>
-          </p:nvPr>
-        </p:nvSpPr>
-        <p:spPr/>
-        <p:txBody>
-          <a:bodyPr/>
-          <a:lstStyle/>
-          <a:p>
-            <a:r>
-              <a:rPr lang="en-US" dirty="0"/>
-              <a:t>Review of key concepts</a:t>
-            </a:r>
-          </a:p>
-        </p:txBody>
-      </p:sp>
-      <p:sp>
-        <p:nvSpPr>
-          <p:cNvPr id="3" name="Content Placeholder 2">
-            <a:extLst>
-              <a:ext uri="{FF2B5EF4-FFF2-40B4-BE49-F238E27FC236}">
-                <a16:creationId xmlns:a16="http://schemas.microsoft.com/office/drawing/2014/main" xmlns="" id="{70870FE1-A863-42A9-BBF2-B9155A37986A}"/>
-              </a:ext>
-            </a:extLst>
-          </p:cNvPr>
-          <p:cNvSpPr>
-            <a:spLocks noGrp="1"/>
-          </p:cNvSpPr>
-          <p:nvPr>
-            <p:ph idx="1"/>
-          </p:nvPr>
-        </p:nvSpPr>
-        <p:spPr/>
-        <p:txBody>
-          <a:bodyPr/>
-          <a:lstStyle/>
-          <a:p>
-            <a:r>
-              <a:rPr lang="en-US" dirty="0"/>
-              <a:t>Hierarchical models contain random effects</a:t>
-            </a:r>
-          </a:p>
-          <a:p>
-            <a:r>
-              <a:rPr lang="en-US" dirty="0"/>
-              <a:t>Occur widely and naturally in ecology</a:t>
-            </a:r>
-          </a:p>
-          <a:p>
-            <a:r>
-              <a:rPr lang="en-US" dirty="0"/>
-              <a:t>A useful way to model our data</a:t>
-            </a:r>
-          </a:p>
-          <a:p>
-            <a:r>
-              <a:rPr lang="en-US" dirty="0"/>
-              <a:t>Requires integration of random effects</a:t>
-            </a:r>
-          </a:p>
-          <a:p>
-            <a:r>
-              <a:rPr lang="en-US" dirty="0"/>
-              <a:t>TMB is integrated with R, but requires writing some C++ code</a:t>
-            </a:r>
-          </a:p>
-          <a:p>
-            <a:r>
-              <a:rPr lang="en-US" dirty="0"/>
-              <a:t>TMB can fit almost all statistical models</a:t>
-            </a:r>
-          </a:p>
-        </p:txBody>
-      </p:sp>
-      <p:sp>
-        <p:nvSpPr>
-          <p:cNvPr id="4" name="Slide Number Placeholder 3">
-            <a:extLst>
-              <a:ext uri="{FF2B5EF4-FFF2-40B4-BE49-F238E27FC236}">
-                <a16:creationId xmlns:a16="http://schemas.microsoft.com/office/drawing/2014/main" xmlns="" id="{2F14697E-4540-4CA4-8BDE-7D7522A7E8AC}"/>
-              </a:ext>
-            </a:extLst>
-          </p:cNvPr>
-          <p:cNvSpPr>
-            <a:spLocks noGrp="1"/>
-          </p:cNvSpPr>
-          <p:nvPr>
-            <p:ph type="sldNum" sz="quarter" idx="12"/>
-          </p:nvPr>
-        </p:nvSpPr>
-        <p:spPr/>
-        <p:txBody>
-          <a:bodyPr/>
-          <a:lstStyle/>
-          <a:p>
-            <a:fld id="{A90099C9-4CB8-9A40-B745-9AB270505907}" type="slidenum">
-              <a:rPr lang="en-US" smtClean="0"/>
-              <a:t>15</a:t>
-            </a:fld>
-            <a:endParaRPr lang="en-US"/>
-          </a:p>
-        </p:txBody>
-      </p:sp>
-    </p:spTree>
-    <p:extLst>
-      <p:ext uri="{BB962C8B-B14F-4D97-AF65-F5344CB8AC3E}">
-        <p14:creationId xmlns:p14="http://schemas.microsoft.com/office/powerpoint/2010/main" val="1998793845"/>
-      </p:ext>
-    </p:extLst>
-  </p:cSld>
-  <p:clrMapOvr>
-    <a:masterClrMapping/>
-  </p:clrMapOvr>
-</p:sld>
-</file>
-
-<file path=ppt/slides/slide16.xml><?xml version="1.0" encoding="utf-8"?>
-<p:sld xmlns:a="http://schemas.openxmlformats.org/drawingml/2006/main" xmlns:r="http://schemas.openxmlformats.org/officeDocument/2006/relationships" xmlns:p="http://schemas.openxmlformats.org/presentationml/2006/main">
-  <p:cSld>
-    <p:spTree>
-      <p:nvGrpSpPr>
-        <p:cNvPr id="1" name=""/>
-        <p:cNvGrpSpPr/>
-        <p:nvPr/>
-      </p:nvGrpSpPr>
-      <p:grpSpPr>
-        <a:xfrm>
-          <a:off x="0" y="0"/>
-          <a:ext cx="0" cy="0"/>
-          <a:chOff x="0" y="0"/>
-          <a:chExt cx="0" cy="0"/>
-        </a:xfrm>
-      </p:grpSpPr>
-      <p:sp>
-        <p:nvSpPr>
-          <p:cNvPr id="2" name="Title 1">
-            <a:extLst>
-              <a:ext uri="{FF2B5EF4-FFF2-40B4-BE49-F238E27FC236}">
-                <a16:creationId xmlns:a16="http://schemas.microsoft.com/office/drawing/2014/main" xmlns="" id="{7280A245-7FE3-43B6-8D2B-011AF59CD45D}"/>
-              </a:ext>
-            </a:extLst>
-          </p:cNvPr>
-          <p:cNvSpPr>
-            <a:spLocks noGrp="1"/>
-          </p:cNvSpPr>
-          <p:nvPr>
-            <p:ph type="title"/>
-          </p:nvPr>
-        </p:nvSpPr>
-        <p:spPr/>
-        <p:txBody>
-          <a:bodyPr/>
-          <a:lstStyle/>
-          <a:p>
-            <a:r>
-              <a:rPr lang="en-US" dirty="0"/>
-              <a:t>Questions?</a:t>
-            </a:r>
-          </a:p>
-        </p:txBody>
-      </p:sp>
-      <p:sp>
-        <p:nvSpPr>
-          <p:cNvPr id="3" name="Content Placeholder 2">
-            <a:extLst>
-              <a:ext uri="{FF2B5EF4-FFF2-40B4-BE49-F238E27FC236}">
-                <a16:creationId xmlns:a16="http://schemas.microsoft.com/office/drawing/2014/main" xmlns="" id="{26BBD7C3-2049-49B5-A014-6CA317494685}"/>
-              </a:ext>
-            </a:extLst>
-          </p:cNvPr>
-          <p:cNvSpPr>
-            <a:spLocks noGrp="1"/>
-          </p:cNvSpPr>
-          <p:nvPr>
-            <p:ph idx="1"/>
-          </p:nvPr>
-        </p:nvSpPr>
-        <p:spPr/>
-        <p:txBody>
-          <a:bodyPr/>
-          <a:lstStyle/>
-          <a:p>
-            <a:endParaRPr lang="en-US"/>
-          </a:p>
-        </p:txBody>
-      </p:sp>
-      <p:sp>
-        <p:nvSpPr>
-          <p:cNvPr id="4" name="Slide Number Placeholder 3">
-            <a:extLst>
-              <a:ext uri="{FF2B5EF4-FFF2-40B4-BE49-F238E27FC236}">
-                <a16:creationId xmlns:a16="http://schemas.microsoft.com/office/drawing/2014/main" xmlns="" id="{2716FDA1-07EC-40B8-B2D3-D4111EDCDD1A}"/>
-              </a:ext>
-            </a:extLst>
-          </p:cNvPr>
-          <p:cNvSpPr>
-            <a:spLocks noGrp="1"/>
-          </p:cNvSpPr>
-          <p:nvPr>
-            <p:ph type="sldNum" sz="quarter" idx="12"/>
-          </p:nvPr>
-        </p:nvSpPr>
-        <p:spPr/>
-        <p:txBody>
-          <a:bodyPr/>
-          <a:lstStyle/>
-          <a:p>
-            <a:fld id="{A90099C9-4CB8-9A40-B745-9AB270505907}" type="slidenum">
-              <a:rPr lang="en-US" smtClean="0"/>
-              <a:t>16</a:t>
-            </a:fld>
-            <a:endParaRPr lang="en-US"/>
-          </a:p>
-        </p:txBody>
-      </p:sp>
-    </p:spTree>
-    <p:extLst>
-      <p:ext uri="{BB962C8B-B14F-4D97-AF65-F5344CB8AC3E}">
-        <p14:creationId xmlns:p14="http://schemas.microsoft.com/office/powerpoint/2010/main" val="3680464407"/>
+        <p14:creationId xmlns:p14="http://schemas.microsoft.com/office/powerpoint/2010/main" val="2067716088"/>
       </p:ext>
     </p:extLst>
   </p:cSld>
@@ -7063,14 +5980,9 @@
           <a:lstStyle/>
           <a:p>
             <a:r>
-              <a:rPr lang="en-US" dirty="0"/>
-              <a:t>Dr. Cole </a:t>
-            </a:r>
-            <a:r>
-              <a:rPr lang="en-US" dirty="0" err="1"/>
-              <a:t>Monnahan</a:t>
-            </a:r>
-            <a:endParaRPr lang="en-US" dirty="0"/>
+              <a:rPr lang="es-CL" noProof="0" dirty="0"/>
+              <a:t>Mi formación</a:t>
+            </a:r>
           </a:p>
         </p:txBody>
       </p:sp>
@@ -7092,7 +6004,7 @@
         </p:spPr>
         <p:txBody>
           <a:bodyPr>
-            <a:normAutofit/>
+            <a:normAutofit lnSpcReduction="10000"/>
           </a:bodyPr>
           <a:lstStyle/>
           <a:p>
@@ -7100,26 +6012,25 @@
               <a:buNone/>
             </a:pPr>
             <a:r>
-              <a:rPr lang="en-US" sz="2400" u="sng" dirty="0" err="1"/>
-              <a:t>Formación</a:t>
-            </a:r>
-            <a:r>
-              <a:rPr lang="en-US" sz="2400" u="sng" dirty="0"/>
-              <a:t> </a:t>
-            </a:r>
-            <a:r>
-              <a:rPr lang="en-US" sz="2400" u="sng" dirty="0" err="1"/>
-              <a:t>Académica</a:t>
-            </a:r>
-            <a:endParaRPr lang="en-US" sz="2400" u="sng" dirty="0"/>
+              <a:rPr lang="es-CL" sz="2400" u="sng" noProof="0" dirty="0"/>
+              <a:t>Formación Académica</a:t>
+            </a:r>
           </a:p>
           <a:p>
             <a:pPr>
               <a:buNone/>
             </a:pPr>
             <a:r>
-              <a:rPr lang="en-US" sz="2400" dirty="0"/>
-              <a:t>University of Washington, M.S.&amp; PhD</a:t>
+              <a:rPr lang="es-CL" sz="2400" noProof="0" dirty="0" err="1"/>
+              <a:t>University</a:t>
+            </a:r>
+            <a:r>
+              <a:rPr lang="es-CL" sz="2400" noProof="0" dirty="0"/>
+              <a:t> of </a:t>
+            </a:r>
+            <a:r>
+              <a:rPr lang="es-CL" sz="2400" noProof="0" dirty="0" smtClean="0"/>
+              <a:t>Washington, Seattle, WA</a:t>
             </a:r>
           </a:p>
           <a:p>
@@ -7127,68 +6038,121 @@
               <a:buNone/>
             </a:pPr>
             <a:r>
-              <a:rPr lang="en-US" sz="2400" dirty="0"/>
-              <a:t>Quantitative Ecology</a:t>
-            </a:r>
+              <a:rPr lang="es-CL" sz="2400" noProof="0" dirty="0" smtClean="0"/>
+              <a:t>M.S. &amp; PhD en ecología </a:t>
+            </a:r>
+            <a:r>
+              <a:rPr lang="es-CL" sz="2400" dirty="0" smtClean="0"/>
+              <a:t>cuantitativa y manejo de recursos naturales (</a:t>
+            </a:r>
+            <a:r>
+              <a:rPr lang="es-CL" sz="2400" i="1" dirty="0" err="1" smtClean="0"/>
+              <a:t>Quantitative</a:t>
+            </a:r>
+            <a:r>
+              <a:rPr lang="es-CL" sz="2400" i="1" dirty="0" smtClean="0"/>
+              <a:t> </a:t>
+            </a:r>
+            <a:r>
+              <a:rPr lang="es-CL" sz="2400" i="1" dirty="0" err="1" smtClean="0"/>
+              <a:t>Ecology</a:t>
+            </a:r>
+            <a:r>
+              <a:rPr lang="es-CL" sz="2400" i="1" dirty="0" smtClean="0"/>
+              <a:t> and </a:t>
+            </a:r>
+            <a:r>
+              <a:rPr lang="es-CL" sz="2400" i="1" dirty="0" err="1" smtClean="0"/>
+              <a:t>Resource</a:t>
+            </a:r>
+            <a:r>
+              <a:rPr lang="es-CL" sz="2400" i="1" dirty="0" smtClean="0"/>
+              <a:t> Management</a:t>
+            </a:r>
+            <a:r>
+              <a:rPr lang="es-CL" sz="2400" dirty="0" smtClean="0"/>
+              <a:t>) </a:t>
+            </a:r>
+            <a:endParaRPr lang="es-CL" sz="2400" noProof="0" dirty="0" smtClean="0"/>
           </a:p>
           <a:p>
             <a:pPr>
               <a:buNone/>
             </a:pPr>
-            <a:endParaRPr lang="en-US" sz="2400" dirty="0"/>
+            <a:endParaRPr lang="es-CL" sz="2400" noProof="0" dirty="0" smtClean="0"/>
           </a:p>
           <a:p>
             <a:pPr>
               <a:buNone/>
             </a:pPr>
             <a:r>
-              <a:rPr lang="en-US" sz="2400" u="sng" dirty="0" err="1"/>
-              <a:t>Actividades</a:t>
-            </a:r>
-            <a:r>
-              <a:rPr lang="en-US" sz="2400" u="sng" dirty="0"/>
-              <a:t> </a:t>
-            </a:r>
-            <a:r>
-              <a:rPr lang="en-US" sz="2400" u="sng" dirty="0" err="1"/>
-              <a:t>Laborales</a:t>
-            </a:r>
-            <a:endParaRPr lang="en-US" sz="2400" u="sng" dirty="0"/>
+              <a:rPr lang="es-CL" sz="2400" u="sng" noProof="0" dirty="0" smtClean="0"/>
+              <a:t>Actividades Laborales</a:t>
+            </a:r>
           </a:p>
           <a:p>
             <a:pPr>
               <a:buNone/>
             </a:pPr>
             <a:r>
-              <a:rPr lang="en-US" sz="2400" dirty="0"/>
-              <a:t>Post-doc con Billy Ernst (</a:t>
-            </a:r>
-            <a:r>
-              <a:rPr lang="en-US" sz="2400" dirty="0" err="1"/>
-              <a:t>UdeC</a:t>
-            </a:r>
-            <a:r>
-              <a:rPr lang="en-US" sz="2400" dirty="0"/>
-              <a:t> &amp; UW)</a:t>
-            </a:r>
+              <a:rPr lang="es-CL" sz="2400" noProof="0" dirty="0" err="1" smtClean="0"/>
+              <a:t>Postdoc</a:t>
+            </a:r>
+            <a:r>
+              <a:rPr lang="es-CL" sz="2400" noProof="0" dirty="0" smtClean="0"/>
+              <a:t> en Seattle con </a:t>
+            </a:r>
+            <a:r>
+              <a:rPr lang="es-CL" sz="2400" noProof="0" dirty="0" err="1" smtClean="0"/>
+              <a:t>Andre</a:t>
+            </a:r>
+            <a:r>
+              <a:rPr lang="es-CL" sz="2400" noProof="0" dirty="0" smtClean="0"/>
+              <a:t> </a:t>
+            </a:r>
+            <a:r>
+              <a:rPr lang="es-CL" sz="2400" noProof="0" dirty="0" err="1" smtClean="0"/>
+              <a:t>Punt</a:t>
+            </a:r>
+            <a:r>
+              <a:rPr lang="es-CL" sz="2400" noProof="0" dirty="0" smtClean="0"/>
+              <a:t>/</a:t>
+            </a:r>
+            <a:r>
+              <a:rPr lang="es-CL" sz="2400" noProof="0" dirty="0" err="1" smtClean="0"/>
+              <a:t>Jim</a:t>
+            </a:r>
+            <a:r>
+              <a:rPr lang="es-CL" sz="2400" noProof="0" dirty="0" smtClean="0"/>
+              <a:t> </a:t>
+            </a:r>
+            <a:r>
+              <a:rPr lang="es-CL" sz="2400" noProof="0" dirty="0" err="1" smtClean="0"/>
+              <a:t>Thorson</a:t>
+            </a:r>
+            <a:r>
+              <a:rPr lang="es-CL" sz="2400" noProof="0" dirty="0" smtClean="0"/>
+              <a:t> usando modelos </a:t>
+            </a:r>
+            <a:r>
+              <a:rPr lang="es-CL" sz="2400" noProof="0" dirty="0" err="1" smtClean="0"/>
+              <a:t>spatiotemporales</a:t>
+            </a:r>
+            <a:endParaRPr lang="es-CL" sz="2400" noProof="0" dirty="0" smtClean="0"/>
           </a:p>
           <a:p>
             <a:pPr>
               <a:buNone/>
             </a:pPr>
-            <a:endParaRPr lang="en-US" sz="2400" dirty="0"/>
+            <a:endParaRPr lang="es-CL" sz="2400" noProof="0" dirty="0"/>
           </a:p>
           <a:p>
             <a:pPr>
               <a:buNone/>
             </a:pPr>
             <a:r>
-              <a:rPr lang="en-US" sz="2400" u="sng" dirty="0" err="1"/>
-              <a:t>Conexión</a:t>
-            </a:r>
-            <a:r>
-              <a:rPr lang="en-US" sz="2400" u="sng" dirty="0"/>
-              <a:t> con Chile</a:t>
+              <a:rPr lang="es-CL" sz="2400" u="sng" noProof="0" dirty="0"/>
+              <a:t>Conexión con Chile</a:t>
             </a:r>
           </a:p>
           <a:p>
@@ -7196,25 +6160,44 @@
               <a:buNone/>
             </a:pPr>
             <a:r>
-              <a:rPr lang="es-ES" sz="2400" dirty="0" err="1"/>
-              <a:t>Quer</a:t>
-            </a:r>
-            <a:r>
-              <a:rPr lang="en-US" sz="2400" dirty="0"/>
-              <a:t>í</a:t>
-            </a:r>
-            <a:r>
-              <a:rPr lang="es-ES" sz="2400" dirty="0"/>
-              <a:t>a vivir en América Latina y aprender español. </a:t>
-            </a:r>
-            <a:endParaRPr lang="en-US" sz="2400" i="1" dirty="0"/>
+              <a:rPr lang="es-CL" sz="2400" dirty="0" err="1" smtClean="0"/>
+              <a:t>Postdoc</a:t>
+            </a:r>
+            <a:r>
+              <a:rPr lang="es-CL" sz="2400" dirty="0" smtClean="0"/>
+              <a:t> </a:t>
+            </a:r>
+            <a:r>
+              <a:rPr lang="es-CL" sz="2400" dirty="0"/>
+              <a:t>con </a:t>
+            </a:r>
+            <a:r>
+              <a:rPr lang="es-CL" sz="2400" dirty="0" smtClean="0"/>
+              <a:t>Prof. Billy </a:t>
+            </a:r>
+            <a:r>
+              <a:rPr lang="es-CL" sz="2400" dirty="0"/>
+              <a:t>Ernst </a:t>
+            </a:r>
+            <a:r>
+              <a:rPr lang="es-CL" sz="2400" dirty="0" smtClean="0"/>
+              <a:t>(</a:t>
+            </a:r>
+            <a:r>
+              <a:rPr lang="es-CL" sz="2400" dirty="0" err="1" smtClean="0"/>
+              <a:t>UdeC</a:t>
+            </a:r>
+            <a:r>
+              <a:rPr lang="es-CL" sz="2400" dirty="0" smtClean="0"/>
+              <a:t>; 2018) </a:t>
+            </a:r>
           </a:p>
         </p:txBody>
       </p:sp>
     </p:spTree>
     <p:extLst>
       <p:ext uri="{BB962C8B-B14F-4D97-AF65-F5344CB8AC3E}">
-        <p14:creationId xmlns:p14="http://schemas.microsoft.com/office/powerpoint/2010/main" val="1804241574"/>
+        <p14:creationId xmlns:p14="http://schemas.microsoft.com/office/powerpoint/2010/main" val="1770903074"/>
       </p:ext>
     </p:extLst>
   </p:cSld>
@@ -7246,7 +6229,7 @@
           <p:cNvPr id="2" name="Title 1">
             <a:extLst>
               <a:ext uri="{FF2B5EF4-FFF2-40B4-BE49-F238E27FC236}">
-                <a16:creationId xmlns:a16="http://schemas.microsoft.com/office/drawing/2014/main" xmlns="" id="{DB90AC74-AA10-44E5-9AE2-55CBF2BF3808}"/>
+                <a16:creationId xmlns="" xmlns:a16="http://schemas.microsoft.com/office/drawing/2014/main" id="{DB90AC74-AA10-44E5-9AE2-55CBF2BF3808}"/>
               </a:ext>
             </a:extLst>
           </p:cNvPr>
@@ -7263,8 +6246,8 @@
           <a:lstStyle/>
           <a:p>
             <a:r>
-              <a:rPr lang="en-US" dirty="0"/>
-              <a:t>California blue whale recovery</a:t>
+              <a:rPr lang="es-CL" noProof="0" dirty="0"/>
+              <a:t>Maestría: un análisis bayesiano de las ballenas azules </a:t>
             </a:r>
           </a:p>
         </p:txBody>
@@ -7274,7 +6257,7 @@
           <p:cNvPr id="5" name="Picture 4">
             <a:extLst>
               <a:ext uri="{FF2B5EF4-FFF2-40B4-BE49-F238E27FC236}">
-                <a16:creationId xmlns:a16="http://schemas.microsoft.com/office/drawing/2014/main" xmlns="" id="{81C46DCB-CB1E-4B0A-9700-81BD751E3CF4}"/>
+                <a16:creationId xmlns="" xmlns:a16="http://schemas.microsoft.com/office/drawing/2014/main" id="{81C46DCB-CB1E-4B0A-9700-81BD751E3CF4}"/>
               </a:ext>
             </a:extLst>
           </p:cNvPr>
@@ -7283,16 +6266,15 @@
           </p:cNvPicPr>
           <p:nvPr/>
         </p:nvPicPr>
-        <p:blipFill>
+        <p:blipFill rotWithShape="1">
           <a:blip r:embed="rId2"/>
-          <a:stretch>
-            <a:fillRect/>
-          </a:stretch>
+          <a:srcRect l="7476" t="29024"/>
+          <a:stretch/>
         </p:blipFill>
         <p:spPr>
           <a:xfrm>
-            <a:off x="342901" y="1150932"/>
-            <a:ext cx="7696200" cy="3451332"/>
+            <a:off x="457200" y="1843612"/>
+            <a:ext cx="7120824" cy="2449614"/>
           </a:xfrm>
           <a:prstGeom prst="rect">
             <a:avLst/>
@@ -7304,7 +6286,7 @@
           <p:cNvPr id="4" name="Picture 3">
             <a:extLst>
               <a:ext uri="{FF2B5EF4-FFF2-40B4-BE49-F238E27FC236}">
-                <a16:creationId xmlns:a16="http://schemas.microsoft.com/office/drawing/2014/main" xmlns="" id="{53887027-52CB-4375-A600-4F711E4938B2}"/>
+                <a16:creationId xmlns="" xmlns:a16="http://schemas.microsoft.com/office/drawing/2014/main" id="{53887027-52CB-4375-A600-4F711E4938B2}"/>
               </a:ext>
             </a:extLst>
           </p:cNvPr>
@@ -7321,7 +6303,7 @@
         </p:blipFill>
         <p:spPr>
           <a:xfrm>
-            <a:off x="4953000" y="3981402"/>
+            <a:off x="4953000" y="3706298"/>
             <a:ext cx="3910012" cy="2575748"/>
           </a:xfrm>
           <a:prstGeom prst="rect">
@@ -7334,7 +6316,7 @@
           <p:cNvPr id="6" name="Content Placeholder 5">
             <a:extLst>
               <a:ext uri="{FF2B5EF4-FFF2-40B4-BE49-F238E27FC236}">
-                <a16:creationId xmlns:a16="http://schemas.microsoft.com/office/drawing/2014/main" xmlns="" id="{6EAE8C30-3901-4FCB-AA7A-EC3D93DB7AC3}"/>
+                <a16:creationId xmlns="" xmlns:a16="http://schemas.microsoft.com/office/drawing/2014/main" id="{6EAE8C30-3901-4FCB-AA7A-EC3D93DB7AC3}"/>
               </a:ext>
             </a:extLst>
           </p:cNvPr>
@@ -7353,7 +6335,7 @@
         </p:blipFill>
         <p:spPr>
           <a:xfrm>
-            <a:off x="243774" y="4719201"/>
+            <a:off x="158049" y="4293226"/>
             <a:ext cx="4572000" cy="1988820"/>
           </a:xfrm>
           <a:prstGeom prst="rect">
@@ -7364,7 +6346,7 @@
     </p:spTree>
     <p:extLst>
       <p:ext uri="{BB962C8B-B14F-4D97-AF65-F5344CB8AC3E}">
-        <p14:creationId xmlns:p14="http://schemas.microsoft.com/office/powerpoint/2010/main" val="1852610975"/>
+        <p14:creationId xmlns:p14="http://schemas.microsoft.com/office/powerpoint/2010/main" val="1143456345"/>
       </p:ext>
     </p:extLst>
   </p:cSld>
@@ -7396,7 +6378,7 @@
           <p:cNvPr id="2" name="Title 1">
             <a:extLst>
               <a:ext uri="{FF2B5EF4-FFF2-40B4-BE49-F238E27FC236}">
-                <a16:creationId xmlns:a16="http://schemas.microsoft.com/office/drawing/2014/main" xmlns="" id="{6CF2B640-BE73-42A6-924C-2E2187BD598F}"/>
+                <a16:creationId xmlns="" xmlns:a16="http://schemas.microsoft.com/office/drawing/2014/main" id="{6CF2B640-BE73-42A6-924C-2E2187BD598F}"/>
               </a:ext>
             </a:extLst>
           </p:cNvPr>
@@ -7413,9 +6395,14 @@
           <a:lstStyle/>
           <a:p>
             <a:r>
-              <a:rPr lang="en-US" dirty="0"/>
-              <a:t>Bayesian fisheries stock assessments</a:t>
-            </a:r>
+              <a:rPr lang="es-CL" noProof="0" dirty="0"/>
+              <a:t>Doctorado: modelos bayesianos por stock </a:t>
+            </a:r>
+            <a:r>
+              <a:rPr lang="es-CL" noProof="0" dirty="0" err="1"/>
+              <a:t>assessment</a:t>
+            </a:r>
+            <a:endParaRPr lang="es-CL" noProof="0" dirty="0"/>
           </a:p>
         </p:txBody>
       </p:sp>
@@ -7424,7 +6411,7 @@
           <p:cNvPr id="3" name="Content Placeholder 2">
             <a:extLst>
               <a:ext uri="{FF2B5EF4-FFF2-40B4-BE49-F238E27FC236}">
-                <a16:creationId xmlns:a16="http://schemas.microsoft.com/office/drawing/2014/main" xmlns="" id="{2AD0FE82-5ACC-4BD4-AFCB-11570EF4139C}"/>
+                <a16:creationId xmlns="" xmlns:a16="http://schemas.microsoft.com/office/drawing/2014/main" id="{2AD0FE82-5ACC-4BD4-AFCB-11570EF4139C}"/>
               </a:ext>
             </a:extLst>
           </p:cNvPr>
@@ -7441,9 +6428,30 @@
           <a:lstStyle/>
           <a:p>
             <a:r>
-              <a:rPr lang="en-US" dirty="0"/>
-              <a:t>Hamiltonian Monte Carlo MCMC for ADMB assessments</a:t>
-            </a:r>
+              <a:rPr lang="es-CL" noProof="0" dirty="0"/>
+              <a:t>Mejoré capacidades bayesianas en ADMB con el algoritmo </a:t>
+            </a:r>
+            <a:r>
+              <a:rPr lang="es-CL" noProof="0" dirty="0" smtClean="0"/>
+              <a:t>‘no-U-</a:t>
+            </a:r>
+            <a:r>
+              <a:rPr lang="es-CL" noProof="0" dirty="0" err="1" smtClean="0"/>
+              <a:t>turn</a:t>
+            </a:r>
+            <a:r>
+              <a:rPr lang="es-CL" noProof="0" dirty="0" smtClean="0"/>
+              <a:t> </a:t>
+            </a:r>
+            <a:r>
+              <a:rPr lang="es-CL" noProof="0" dirty="0" err="1" smtClean="0"/>
+              <a:t>sampler</a:t>
+            </a:r>
+            <a:r>
+              <a:rPr lang="es-CL" noProof="0" dirty="0" smtClean="0"/>
+              <a:t>’</a:t>
+            </a:r>
+            <a:endParaRPr lang="es-CL" noProof="0" dirty="0"/>
           </a:p>
         </p:txBody>
       </p:sp>
@@ -7452,7 +6460,7 @@
           <p:cNvPr id="4" name="Picture 3">
             <a:extLst>
               <a:ext uri="{FF2B5EF4-FFF2-40B4-BE49-F238E27FC236}">
-                <a16:creationId xmlns:a16="http://schemas.microsoft.com/office/drawing/2014/main" xmlns="" id="{689B31E6-9782-484F-B455-184B81BAA6CF}"/>
+                <a16:creationId xmlns="" xmlns:a16="http://schemas.microsoft.com/office/drawing/2014/main" id="{689B31E6-9782-484F-B455-184B81BAA6CF}"/>
               </a:ext>
             </a:extLst>
           </p:cNvPr>
@@ -7480,7 +6488,7 @@
     </p:spTree>
     <p:extLst>
       <p:ext uri="{BB962C8B-B14F-4D97-AF65-F5344CB8AC3E}">
-        <p14:creationId xmlns:p14="http://schemas.microsoft.com/office/powerpoint/2010/main" val="4096561754"/>
+        <p14:creationId xmlns:p14="http://schemas.microsoft.com/office/powerpoint/2010/main" val="3062400205"/>
       </p:ext>
     </p:extLst>
   </p:cSld>
@@ -7525,79 +6533,16 @@
           <a:lstStyle/>
           <a:p>
             <a:r>
-              <a:rPr lang="en-US" dirty="0"/>
-              <a:t>Postdoc: Un </a:t>
-            </a:r>
-            <a:r>
-              <a:rPr lang="en-US" dirty="0" err="1"/>
-              <a:t>análisis</a:t>
-            </a:r>
-            <a:r>
-              <a:rPr lang="en-US" dirty="0"/>
-              <a:t> de </a:t>
-            </a:r>
-            <a:r>
-              <a:rPr lang="en-US" dirty="0" err="1"/>
-              <a:t>Ballenas</a:t>
-            </a:r>
-            <a:r>
-              <a:rPr lang="en-US" dirty="0"/>
-              <a:t> </a:t>
-            </a:r>
-            <a:r>
-              <a:rPr lang="en-US" dirty="0" err="1"/>
-              <a:t>jorobadas</a:t>
-            </a:r>
-            <a:r>
-              <a:rPr lang="en-US" dirty="0"/>
-              <a:t/>
-            </a:r>
-            <a:br>
-              <a:rPr lang="en-US" dirty="0"/>
-            </a:br>
-            <a:r>
-              <a:rPr lang="en-US" dirty="0" err="1"/>
-              <a:t>Estrecho</a:t>
-            </a:r>
-            <a:r>
-              <a:rPr lang="en-US" dirty="0"/>
-              <a:t> de Magallanes</a:t>
-            </a:r>
-          </a:p>
-        </p:txBody>
-      </p:sp>
-      <p:pic>
-        <p:nvPicPr>
-          <p:cNvPr id="3" name="Picture 2"/>
-          <p:cNvPicPr>
-            <a:picLocks noChangeAspect="1" noChangeArrowheads="1"/>
-          </p:cNvPicPr>
-          <p:nvPr/>
-        </p:nvPicPr>
-        <p:blipFill>
-          <a:blip r:embed="rId2" cstate="print"/>
-          <a:srcRect/>
-          <a:stretch>
-            <a:fillRect/>
-          </a:stretch>
-        </p:blipFill>
-        <p:spPr bwMode="auto">
-          <a:xfrm>
-            <a:off x="457200" y="1600200"/>
-            <a:ext cx="2209800" cy="2220849"/>
-          </a:xfrm>
-          <a:prstGeom prst="rect">
-            <a:avLst/>
-          </a:prstGeom>
-          <a:noFill/>
-          <a:ln w="9525">
-            <a:noFill/>
-            <a:miter lim="800000"/>
-            <a:headEnd/>
-            <a:tailEnd/>
-          </a:ln>
-        </p:spPr>
-      </p:pic>
+              <a:rPr lang="es-CL" noProof="0" dirty="0" err="1"/>
+              <a:t>Postdoc</a:t>
+            </a:r>
+            <a:r>
+              <a:rPr lang="es-CL" noProof="0" dirty="0"/>
+              <a:t>: Un análisis bayesiano de ballenas jorobadas del Estrecho de Magallanes</a:t>
+            </a:r>
+          </a:p>
+        </p:txBody>
+      </p:sp>
       <p:pic>
         <p:nvPicPr>
           <p:cNvPr id="4" name="Picture 3"/>
@@ -7607,97 +6552,54 @@
           <p:nvPr/>
         </p:nvPicPr>
         <p:blipFill>
-          <a:blip r:embed="rId3"/>
+          <a:blip r:embed="rId2"/>
           <a:stretch>
             <a:fillRect/>
           </a:stretch>
         </p:blipFill>
         <p:spPr>
           <a:xfrm>
-            <a:off x="1600200" y="4419600"/>
-            <a:ext cx="3962400" cy="2057400"/>
+            <a:off x="5025005" y="4536083"/>
+            <a:ext cx="2771163" cy="1438873"/>
           </a:xfrm>
           <a:prstGeom prst="rect">
             <a:avLst/>
           </a:prstGeom>
         </p:spPr>
       </p:pic>
-      <p:cxnSp>
-        <p:nvCxnSpPr>
-          <p:cNvPr id="6" name="Straight Connector 5"/>
-          <p:cNvCxnSpPr/>
+      <p:pic>
+        <p:nvPicPr>
+          <p:cNvPr id="24" name="Picture 23" descr="Avistamiento-ballenas_Luis-Bertea-1024x568.jpg"/>
+          <p:cNvPicPr>
+            <a:picLocks noChangeAspect="1"/>
+          </p:cNvPicPr>
           <p:nvPr/>
-        </p:nvCxnSpPr>
+        </p:nvPicPr>
+        <p:blipFill>
+          <a:blip r:embed="rId3">
+            <a:extLst>
+              <a:ext uri="{28A0092B-C50C-407E-A947-70E740481C1C}">
+                <a14:useLocalDpi xmlns:a14="http://schemas.microsoft.com/office/drawing/2010/main" val="0"/>
+              </a:ext>
+            </a:extLst>
+          </a:blip>
+          <a:stretch>
+            <a:fillRect/>
+          </a:stretch>
+        </p:blipFill>
         <p:spPr>
           <a:xfrm>
-            <a:off x="1404493" y="3761642"/>
-            <a:ext cx="195707" cy="2715358"/>
-          </a:xfrm>
-          <a:prstGeom prst="line">
-            <a:avLst/>
-          </a:prstGeom>
-          <a:ln>
-            <a:solidFill>
-              <a:schemeClr val="tx1"/>
-            </a:solidFill>
-          </a:ln>
-        </p:spPr>
-        <p:style>
-          <a:lnRef idx="1">
-            <a:schemeClr val="accent1"/>
-          </a:lnRef>
-          <a:fillRef idx="0">
-            <a:schemeClr val="accent1"/>
-          </a:fillRef>
-          <a:effectRef idx="0">
-            <a:schemeClr val="accent1"/>
-          </a:effectRef>
-          <a:fontRef idx="minor">
-            <a:schemeClr val="tx1"/>
-          </a:fontRef>
-        </p:style>
-      </p:cxnSp>
-      <p:sp>
-        <p:nvSpPr>
-          <p:cNvPr id="23" name="TextBox 22"/>
-          <p:cNvSpPr txBox="1"/>
-          <p:nvPr/>
-        </p:nvSpPr>
-        <p:spPr>
-          <a:xfrm>
-            <a:off x="6858000" y="4202668"/>
-            <a:ext cx="2514600" cy="369332"/>
+            <a:off x="4191000" y="1600200"/>
+            <a:ext cx="4800600" cy="2662833"/>
           </a:xfrm>
           <a:prstGeom prst="rect">
             <a:avLst/>
           </a:prstGeom>
-          <a:noFill/>
-        </p:spPr>
-        <p:txBody>
-          <a:bodyPr wrap="square" rtlCol="0">
-            <a:spAutoFit/>
-          </a:bodyPr>
-          <a:lstStyle/>
-          <a:p>
-            <a:r>
-              <a:rPr lang="en-US" dirty="0" err="1"/>
-              <a:t>Crédito</a:t>
-            </a:r>
-            <a:r>
-              <a:rPr lang="en-US" dirty="0"/>
-              <a:t>: Luis </a:t>
-            </a:r>
-            <a:r>
-              <a:rPr lang="en-US" dirty="0" err="1"/>
-              <a:t>Bertea</a:t>
-            </a:r>
-            <a:endParaRPr lang="en-US" dirty="0"/>
-          </a:p>
-        </p:txBody>
-      </p:sp>
+        </p:spPr>
+      </p:pic>
       <p:pic>
         <p:nvPicPr>
-          <p:cNvPr id="24" name="Picture 23" descr="Avistamiento-ballenas_Luis-Bertea-1024x568.jpg"/>
+          <p:cNvPr id="8" name="Picture 7"/>
           <p:cNvPicPr>
             <a:picLocks noChangeAspect="1"/>
           </p:cNvPicPr>
@@ -7717,53 +6619,56 @@
         </p:blipFill>
         <p:spPr>
           <a:xfrm>
-            <a:off x="4191000" y="1600200"/>
-            <a:ext cx="4800600" cy="2662833"/>
+            <a:off x="403370" y="1600200"/>
+            <a:ext cx="2995491" cy="4491651"/>
           </a:xfrm>
           <a:prstGeom prst="rect">
             <a:avLst/>
           </a:prstGeom>
         </p:spPr>
       </p:pic>
-      <p:cxnSp>
-        <p:nvCxnSpPr>
-          <p:cNvPr id="5" name="Straight Connector 4"/>
-          <p:cNvCxnSpPr/>
+      <p:sp>
+        <p:nvSpPr>
+          <p:cNvPr id="23" name="TextBox 22"/>
+          <p:cNvSpPr txBox="1"/>
           <p:nvPr/>
-        </p:nvCxnSpPr>
+        </p:nvSpPr>
         <p:spPr>
           <a:xfrm>
-            <a:off x="1404493" y="3756260"/>
-            <a:ext cx="4158107" cy="663340"/>
+            <a:off x="6312715" y="1608589"/>
+            <a:ext cx="2514600" cy="369332"/>
           </a:xfrm>
-          <a:prstGeom prst="line">
+          <a:prstGeom prst="rect">
             <a:avLst/>
           </a:prstGeom>
-          <a:ln>
-            <a:solidFill>
-              <a:schemeClr val="tx1"/>
-            </a:solidFill>
-          </a:ln>
-        </p:spPr>
-        <p:style>
-          <a:lnRef idx="1">
-            <a:schemeClr val="accent1"/>
-          </a:lnRef>
-          <a:fillRef idx="0">
-            <a:schemeClr val="accent1"/>
-          </a:fillRef>
-          <a:effectRef idx="0">
-            <a:schemeClr val="accent1"/>
-          </a:effectRef>
-          <a:fontRef idx="minor">
-            <a:schemeClr val="tx1"/>
-          </a:fontRef>
-        </p:style>
-      </p:cxnSp>
+          <a:noFill/>
+        </p:spPr>
+        <p:txBody>
+          <a:bodyPr wrap="square" rtlCol="0">
+            <a:spAutoFit/>
+          </a:bodyPr>
+          <a:lstStyle/>
+          <a:p>
+            <a:r>
+              <a:rPr lang="en-US" dirty="0" err="1"/>
+              <a:t>Crédito</a:t>
+            </a:r>
+            <a:r>
+              <a:rPr lang="en-US" dirty="0"/>
+              <a:t>: Luis </a:t>
+            </a:r>
+            <a:r>
+              <a:rPr lang="en-US" dirty="0" err="1"/>
+              <a:t>Bertea</a:t>
+            </a:r>
+            <a:endParaRPr lang="en-US" dirty="0"/>
+          </a:p>
+        </p:txBody>
+      </p:sp>
     </p:spTree>
     <p:extLst>
       <p:ext uri="{BB962C8B-B14F-4D97-AF65-F5344CB8AC3E}">
-        <p14:creationId xmlns:p14="http://schemas.microsoft.com/office/powerpoint/2010/main" val="433659125"/>
+        <p14:creationId xmlns:p14="http://schemas.microsoft.com/office/powerpoint/2010/main" val="2482040113"/>
       </p:ext>
     </p:extLst>
   </p:cSld>
@@ -7806,40 +6711,8 @@
           <a:lstStyle/>
           <a:p>
             <a:r>
-              <a:rPr lang="en-US" dirty="0"/>
-              <a:t>Y </a:t>
-            </a:r>
-            <a:r>
-              <a:rPr lang="en-US" dirty="0" err="1"/>
-              <a:t>ahora</a:t>
-            </a:r>
-            <a:r>
-              <a:rPr lang="en-US" dirty="0"/>
-              <a:t> </a:t>
-            </a:r>
-            <a:r>
-              <a:rPr lang="en-US" dirty="0" err="1"/>
-              <a:t>es</a:t>
-            </a:r>
-            <a:r>
-              <a:rPr lang="en-US" dirty="0"/>
-              <a:t> </a:t>
-            </a:r>
-            <a:r>
-              <a:rPr lang="en-US" dirty="0" err="1"/>
-              <a:t>su</a:t>
-            </a:r>
-            <a:r>
-              <a:rPr lang="en-US" dirty="0"/>
-              <a:t> </a:t>
-            </a:r>
-            <a:r>
-              <a:rPr lang="en-US" dirty="0" err="1"/>
-              <a:t>turno</a:t>
-            </a:r>
-            <a:r>
-              <a:rPr lang="en-US" dirty="0"/>
-              <a:t>…</a:t>
+              <a:rPr lang="es-CL" noProof="0" dirty="0"/>
+              <a:t>Y ahora es su turno…</a:t>
             </a:r>
           </a:p>
         </p:txBody>
@@ -7869,24 +6742,8 @@
               <a:buAutoNum type="arabicPeriod"/>
             </a:pPr>
             <a:r>
-              <a:rPr lang="en-US" dirty="0"/>
-              <a:t>¿</a:t>
-            </a:r>
-            <a:r>
-              <a:rPr lang="en-US" dirty="0" err="1"/>
-              <a:t>Experiencia</a:t>
-            </a:r>
-            <a:r>
-              <a:rPr lang="en-US" dirty="0"/>
-              <a:t> &amp; </a:t>
-            </a:r>
-            <a:r>
-              <a:rPr lang="en-US" dirty="0" err="1"/>
-              <a:t>Interés</a:t>
-            </a:r>
-            <a:r>
-              <a:rPr lang="en-US" dirty="0"/>
-              <a:t>?</a:t>
+              <a:rPr lang="es-CL" noProof="0" dirty="0"/>
+              <a:t>¿Nombre, departamento?</a:t>
             </a:r>
           </a:p>
           <a:p>
@@ -7894,7 +6751,18 @@
               <a:buFont typeface="+mj-lt"/>
               <a:buAutoNum type="arabicPeriod"/>
             </a:pPr>
-            <a:endParaRPr lang="en-US" dirty="0"/>
+            <a:r>
+              <a:rPr lang="es-CL" noProof="0" dirty="0"/>
+              <a:t>¿Qué es </a:t>
+            </a:r>
+            <a:r>
+              <a:rPr lang="es-CL" noProof="0" dirty="0" smtClean="0"/>
+              <a:t>el tema </a:t>
+            </a:r>
+            <a:r>
+              <a:rPr lang="es-CL" noProof="0" dirty="0"/>
+              <a:t>de tu tesis?</a:t>
+            </a:r>
           </a:p>
           <a:p>
             <a:pPr marL="514350" indent="-514350">
@@ -7902,40 +6770,12 @@
               <a:buAutoNum type="arabicPeriod"/>
             </a:pPr>
             <a:r>
-              <a:rPr lang="en-US" dirty="0"/>
-              <a:t>¿</a:t>
-            </a:r>
-            <a:r>
-              <a:rPr lang="en-US" dirty="0" err="1"/>
-              <a:t>Qué</a:t>
-            </a:r>
-            <a:r>
-              <a:rPr lang="en-US" dirty="0"/>
-              <a:t> </a:t>
-            </a:r>
-            <a:r>
-              <a:rPr lang="en-US" dirty="0" err="1"/>
-              <a:t>espera</a:t>
-            </a:r>
-            <a:r>
-              <a:rPr lang="en-US" dirty="0"/>
-              <a:t> a </a:t>
-            </a:r>
-            <a:r>
-              <a:rPr lang="en-US" dirty="0" err="1"/>
-              <a:t>realizar</a:t>
-            </a:r>
-            <a:r>
-              <a:rPr lang="en-US" dirty="0"/>
-              <a:t> del </a:t>
-            </a:r>
-            <a:r>
-              <a:rPr lang="en-US" dirty="0" err="1"/>
-              <a:t>curso</a:t>
-            </a:r>
-            <a:r>
-              <a:rPr lang="en-US" dirty="0"/>
-              <a:t>?</a:t>
+              <a:rPr lang="es-CL" dirty="0"/>
+              <a:t>¿Qué es </a:t>
+            </a:r>
+            <a:r>
+              <a:rPr lang="es-CL" noProof="0" dirty="0"/>
+              <a:t>tu experiencia con modelos bayesianos?</a:t>
             </a:r>
           </a:p>
           <a:p>
@@ -7943,7 +6783,11 @@
               <a:buFont typeface="+mj-lt"/>
               <a:buAutoNum type="arabicPeriod"/>
             </a:pPr>
-            <a:endParaRPr lang="en-US" dirty="0"/>
+            <a:r>
+              <a:rPr lang="es-CL" dirty="0"/>
+              <a:t>¿Cual software has usado? </a:t>
+            </a:r>
+            <a:endParaRPr lang="es-CL" noProof="0" dirty="0"/>
           </a:p>
           <a:p>
             <a:pPr marL="514350" indent="-514350">
@@ -7951,107 +6795,65 @@
               <a:buAutoNum type="arabicPeriod"/>
             </a:pPr>
             <a:r>
-              <a:rPr lang="en-US" dirty="0"/>
-              <a:t>¿Que </a:t>
-            </a:r>
-            <a:r>
-              <a:rPr lang="en-US" dirty="0" err="1"/>
-              <a:t>es</a:t>
-            </a:r>
-            <a:r>
-              <a:rPr lang="en-US" dirty="0"/>
+              <a:rPr lang="es-CL" noProof="0" dirty="0" err="1"/>
+              <a:t>How</a:t>
+            </a:r>
+            <a:r>
+              <a:rPr lang="es-CL" noProof="0" dirty="0"/>
               <a:t> </a:t>
             </a:r>
             <a:r>
-              <a:rPr lang="en-US" dirty="0" err="1"/>
-              <a:t>su</a:t>
-            </a:r>
-            <a:r>
-              <a:rPr lang="en-US" dirty="0"/>
+              <a:rPr lang="es-CL" noProof="0" dirty="0" err="1"/>
+              <a:t>is</a:t>
+            </a:r>
+            <a:r>
+              <a:rPr lang="es-CL" noProof="0" dirty="0"/>
               <a:t> </a:t>
             </a:r>
             <a:r>
-              <a:rPr lang="en-US" dirty="0" err="1"/>
-              <a:t>experiencia</a:t>
-            </a:r>
-            <a:r>
-              <a:rPr lang="en-US" dirty="0"/>
-              <a:t> con </a:t>
-            </a:r>
-            <a:r>
-              <a:rPr lang="en-US" dirty="0" err="1"/>
-              <a:t>modelos</a:t>
-            </a:r>
-            <a:r>
-              <a:rPr lang="en-US" dirty="0"/>
-              <a:t> </a:t>
-            </a:r>
-            <a:r>
-              <a:rPr lang="en-US" dirty="0" err="1" smtClean="0"/>
-              <a:t>Bayesianos</a:t>
-            </a:r>
-            <a:r>
-              <a:rPr lang="en-US" dirty="0" smtClean="0"/>
-              <a:t>?</a:t>
-            </a:r>
-            <a:endParaRPr lang="en-US" dirty="0"/>
-          </a:p>
-          <a:p>
-            <a:pPr marL="514350" indent="-514350">
-              <a:buFont typeface="+mj-lt"/>
-              <a:buAutoNum type="arabicPeriod"/>
-            </a:pPr>
-            <a:r>
-              <a:rPr lang="en-US" dirty="0"/>
-              <a:t>¿</a:t>
-            </a:r>
-            <a:r>
-              <a:rPr lang="en-US" dirty="0" err="1"/>
-              <a:t>Qué</a:t>
-            </a:r>
-            <a:r>
-              <a:rPr lang="en-US" dirty="0"/>
-              <a:t> </a:t>
-            </a:r>
-            <a:r>
-              <a:rPr lang="en-US" dirty="0" err="1"/>
-              <a:t>es</a:t>
-            </a:r>
-            <a:r>
-              <a:rPr lang="en-US" dirty="0"/>
-              <a:t> </a:t>
-            </a:r>
-            <a:r>
-              <a:rPr lang="en-US" dirty="0" err="1"/>
-              <a:t>su</a:t>
-            </a:r>
-            <a:r>
-              <a:rPr lang="en-US" dirty="0"/>
-              <a:t> </a:t>
-            </a:r>
-            <a:r>
-              <a:rPr lang="en-US" dirty="0" err="1"/>
-              <a:t>experiencia</a:t>
-            </a:r>
-            <a:r>
-              <a:rPr lang="en-US" dirty="0"/>
-              <a:t> con el </a:t>
-            </a:r>
-            <a:r>
-              <a:rPr lang="en-US" dirty="0" err="1"/>
-              <a:t>idioma</a:t>
-            </a:r>
-            <a:r>
-              <a:rPr lang="en-US" dirty="0"/>
-              <a:t> R </a:t>
-            </a:r>
+              <a:rPr lang="es-CL" noProof="0" dirty="0" err="1"/>
+              <a:t>your</a:t>
+            </a:r>
+            <a:r>
+              <a:rPr lang="es-CL" noProof="0" dirty="0"/>
+              <a:t> English? </a:t>
+            </a:r>
+            <a:r>
+              <a:rPr lang="es-CL" dirty="0"/>
+              <a:t>Reading, </a:t>
+            </a:r>
+            <a:r>
+              <a:rPr lang="es-CL" dirty="0" err="1"/>
+              <a:t>writing</a:t>
+            </a:r>
+            <a:r>
+              <a:rPr lang="es-CL" dirty="0"/>
+              <a:t>, </a:t>
+            </a:r>
+            <a:r>
+              <a:rPr lang="es-CL" dirty="0" err="1"/>
+              <a:t>listening</a:t>
+            </a:r>
+            <a:r>
+              <a:rPr lang="es-CL" dirty="0"/>
+              <a:t>, </a:t>
+            </a:r>
+            <a:r>
+              <a:rPr lang="es-CL" dirty="0" err="1"/>
+              <a:t>speaking</a:t>
+            </a:r>
+            <a:r>
+              <a:rPr lang="es-CL" dirty="0"/>
+              <a:t>…</a:t>
+            </a:r>
+            <a:endParaRPr lang="es-CL" noProof="0" dirty="0"/>
           </a:p>
         </p:txBody>
       </p:sp>
     </p:spTree>
     <p:extLst>
       <p:ext uri="{BB962C8B-B14F-4D97-AF65-F5344CB8AC3E}">
-        <p14:creationId xmlns:p14="http://schemas.microsoft.com/office/powerpoint/2010/main" val="3184585196"/>
+        <p14:creationId xmlns:p14="http://schemas.microsoft.com/office/powerpoint/2010/main" val="3831461605"/>
       </p:ext>
     </p:extLst>
   </p:cSld>
@@ -8083,7 +6885,7 @@
           <p:cNvPr id="2" name="Title 1">
             <a:extLst>
               <a:ext uri="{FF2B5EF4-FFF2-40B4-BE49-F238E27FC236}">
-                <a16:creationId xmlns:a16="http://schemas.microsoft.com/office/drawing/2014/main" xmlns="" id="{E9BA492F-EA88-4CF7-9069-CBDF94477AAB}"/>
+                <a16:creationId xmlns="" xmlns:a16="http://schemas.microsoft.com/office/drawing/2014/main" id="{B8B4D507-C9FA-49F2-A4C2-A66BA63AD8FD}"/>
               </a:ext>
             </a:extLst>
           </p:cNvPr>
@@ -8100,9 +6902,14 @@
           <a:lstStyle/>
           <a:p>
             <a:r>
-              <a:rPr lang="en-US" dirty="0"/>
-              <a:t>Course goals</a:t>
-            </a:r>
+              <a:rPr lang="es-CL" noProof="0" dirty="0"/>
+              <a:t>Objetivos y resumen del </a:t>
+            </a:r>
+            <a:r>
+              <a:rPr lang="es-CL" noProof="0" dirty="0" smtClean="0"/>
+              <a:t>curso</a:t>
+            </a:r>
+            <a:endParaRPr lang="es-CL" noProof="0" dirty="0"/>
           </a:p>
         </p:txBody>
       </p:sp>
@@ -8111,7 +6918,7 @@
           <p:cNvPr id="3" name="Content Placeholder 2">
             <a:extLst>
               <a:ext uri="{FF2B5EF4-FFF2-40B4-BE49-F238E27FC236}">
-                <a16:creationId xmlns:a16="http://schemas.microsoft.com/office/drawing/2014/main" xmlns="" id="{A2B4034A-6C7D-489B-B474-A9E452B6B139}"/>
+                <a16:creationId xmlns="" xmlns:a16="http://schemas.microsoft.com/office/drawing/2014/main" id="{F71EA7B9-01B7-4DEE-B9B5-44F8406ECC23}"/>
               </a:ext>
             </a:extLst>
           </p:cNvPr>
@@ -8122,70 +6929,49 @@
             <p:ph idx="1"/>
           </p:nvPr>
         </p:nvSpPr>
-        <p:spPr/>
+        <p:spPr>
+          <a:xfrm>
+            <a:off x="465589" y="1312292"/>
+            <a:ext cx="8229600" cy="4801855"/>
+          </a:xfrm>
+        </p:spPr>
         <p:txBody>
           <a:bodyPr/>
           <a:lstStyle/>
           <a:p>
-            <a:pPr marL="514350" indent="-514350">
-              <a:buFont typeface="+mj-lt"/>
-              <a:buAutoNum type="arabicPeriod"/>
-            </a:pPr>
-            <a:r>
-              <a:rPr lang="en-US" dirty="0"/>
-              <a:t>Gain </a:t>
-            </a:r>
-            <a:r>
-              <a:rPr lang="en-US" dirty="0" smtClean="0"/>
-              <a:t>comfort with distributions and how to integrate them numerically</a:t>
-            </a:r>
-            <a:endParaRPr lang="en-US" dirty="0"/>
-          </a:p>
-          <a:p>
-            <a:pPr marL="514350" indent="-514350">
-              <a:buFont typeface="+mj-lt"/>
-              <a:buAutoNum type="arabicPeriod"/>
-            </a:pPr>
-            <a:r>
-              <a:rPr lang="en-US" dirty="0" smtClean="0"/>
-              <a:t>Basics of Bayesian modeling: likelihood, prior, posterior</a:t>
-            </a:r>
-          </a:p>
-          <a:p>
-            <a:pPr marL="514350" indent="-514350">
-              <a:buFont typeface="+mj-lt"/>
-              <a:buAutoNum type="arabicPeriod"/>
-            </a:pPr>
-            <a:r>
-              <a:rPr lang="en-US" dirty="0" smtClean="0"/>
-              <a:t>Understand what MCMC is and why necessary</a:t>
-            </a:r>
-          </a:p>
-          <a:p>
-            <a:pPr marL="514350" indent="-514350">
-              <a:buFont typeface="+mj-lt"/>
-              <a:buAutoNum type="arabicPeriod"/>
-            </a:pPr>
-            <a:r>
-              <a:rPr lang="en-US" dirty="0" smtClean="0"/>
-              <a:t>Robust workflow for real problems, including hiera</a:t>
-            </a:r>
-            <a:r>
-              <a:rPr lang="en-US" dirty="0" smtClean="0"/>
-              <a:t>rchical Bayesian modeling </a:t>
-            </a:r>
-            <a:endParaRPr lang="en-US" dirty="0"/>
-          </a:p>
-          <a:p>
-            <a:pPr marL="514350" indent="-514350">
-              <a:buFont typeface="+mj-lt"/>
-              <a:buAutoNum type="arabicPeriod"/>
-            </a:pPr>
-            <a:r>
-              <a:rPr lang="en-US" dirty="0" smtClean="0"/>
-              <a:t>Basic understanding of Hamiltonian Monte Carlo and Stan </a:t>
-            </a:r>
-            <a:endParaRPr lang="en-US" dirty="0"/>
+            <a:r>
+              <a:rPr lang="es-419" dirty="0" smtClean="0"/>
+              <a:t>Aprender los básicos de inferencia bayesiana</a:t>
+            </a:r>
+          </a:p>
+          <a:p>
+            <a:r>
+              <a:rPr lang="es-419" dirty="0" smtClean="0"/>
+              <a:t>Que es MCMC y por que lo usamos? </a:t>
+            </a:r>
+          </a:p>
+          <a:p>
+            <a:r>
+              <a:rPr lang="es-419" dirty="0" smtClean="0"/>
+              <a:t>Desarrollar modelos aplicados bayesianos en JAGS y Stan</a:t>
+            </a:r>
+          </a:p>
+          <a:p>
+            <a:r>
+              <a:rPr lang="es-419" dirty="0" smtClean="0"/>
+              <a:t>Leer y discutir publicaciones y sus metodólogos</a:t>
+            </a:r>
+          </a:p>
+          <a:p>
+            <a:r>
+              <a:rPr lang="es-419" dirty="0" smtClean="0"/>
+              <a:t>Practicar idiomas; les animo hablar/preguntar/escribir en inglés (siempre que </a:t>
+            </a:r>
+            <a:r>
+              <a:rPr lang="es-419" smtClean="0"/>
+              <a:t>sea posible)</a:t>
+            </a:r>
+            <a:endParaRPr lang="es-419" dirty="0"/>
           </a:p>
         </p:txBody>
       </p:sp>
@@ -8194,7 +6980,7 @@
           <p:cNvPr id="4" name="Slide Number Placeholder 3">
             <a:extLst>
               <a:ext uri="{FF2B5EF4-FFF2-40B4-BE49-F238E27FC236}">
-                <a16:creationId xmlns:a16="http://schemas.microsoft.com/office/drawing/2014/main" xmlns="" id="{70F2C2C3-2FC4-499F-B5F0-7DB732BF7A00}"/>
+                <a16:creationId xmlns="" xmlns:a16="http://schemas.microsoft.com/office/drawing/2014/main" id="{B72ADAC1-E81C-496A-88FD-83B794DF84D4}"/>
               </a:ext>
             </a:extLst>
           </p:cNvPr>
@@ -8210,7 +6996,7 @@
           <a:bodyPr/>
           <a:lstStyle/>
           <a:p>
-            <a:fld id="{A90099C9-4CB8-9A40-B745-9AB270505907}" type="slidenum">
+            <a:fld id="{2F5854F6-968A-43DD-98AD-2128488B7BB7}" type="slidenum">
               <a:rPr lang="en-US" smtClean="0"/>
               <a:t>7</a:t>
             </a:fld>
@@ -8221,7 +7007,7 @@
     </p:spTree>
     <p:extLst>
       <p:ext uri="{BB962C8B-B14F-4D97-AF65-F5344CB8AC3E}">
-        <p14:creationId xmlns:p14="http://schemas.microsoft.com/office/powerpoint/2010/main" val="1510102819"/>
+        <p14:creationId xmlns:p14="http://schemas.microsoft.com/office/powerpoint/2010/main" val="655259397"/>
       </p:ext>
     </p:extLst>
   </p:cSld>
@@ -8250,13 +7036,7 @@
       </p:grpSpPr>
       <p:sp>
         <p:nvSpPr>
-          <p:cNvPr id="2" name="Title 1">
-            <a:extLst>
-              <a:ext uri="{FF2B5EF4-FFF2-40B4-BE49-F238E27FC236}">
-                <a16:creationId xmlns:a16="http://schemas.microsoft.com/office/drawing/2014/main" xmlns="" id="{E622C5D6-127E-4E13-A682-50C23F6FCCA3}"/>
-              </a:ext>
-            </a:extLst>
-          </p:cNvPr>
+          <p:cNvPr id="2" name="Title 1"/>
           <p:cNvSpPr>
             <a:spLocks noGrp="1"/>
           </p:cNvSpPr>
@@ -8271,24 +7051,15 @@
           <a:p>
             <a:r>
               <a:rPr lang="en-US" dirty="0" smtClean="0"/>
-              <a:t>Bayesian modeling: </a:t>
-            </a:r>
-            <a:r>
-              <a:rPr lang="en-US" dirty="0"/>
-              <a:t>overview</a:t>
-            </a:r>
-          </a:p>
-        </p:txBody>
-      </p:sp>
-      <p:sp>
-        <p:nvSpPr>
-          <p:cNvPr id="3" name="Content Placeholder 2">
-            <a:extLst>
-              <a:ext uri="{FF2B5EF4-FFF2-40B4-BE49-F238E27FC236}">
-                <a16:creationId xmlns:a16="http://schemas.microsoft.com/office/drawing/2014/main" xmlns="" id="{6C383712-B948-4BB6-80DA-20C80E766461}"/>
-              </a:ext>
-            </a:extLst>
-          </p:cNvPr>
+              <a:t>Course overview</a:t>
+            </a:r>
+            <a:endParaRPr lang="en-US" dirty="0"/>
+          </a:p>
+        </p:txBody>
+      </p:sp>
+      <p:sp>
+        <p:nvSpPr>
+          <p:cNvPr id="3" name="Content Placeholder 2"/>
           <p:cNvSpPr>
             <a:spLocks noGrp="1"/>
           </p:cNvSpPr>
@@ -8296,83 +7067,50 @@
             <p:ph idx="1"/>
           </p:nvPr>
         </p:nvSpPr>
-        <p:spPr>
-          <a:xfrm>
-            <a:off x="628650" y="1091361"/>
-            <a:ext cx="7886700" cy="4382670"/>
-          </a:xfrm>
-        </p:spPr>
+        <p:spPr/>
         <p:txBody>
           <a:bodyPr/>
           <a:lstStyle/>
           <a:p>
             <a:r>
-              <a:rPr lang="en-US" sz="2800" dirty="0"/>
-              <a:t>Class of model with a hierarchical structure</a:t>
-            </a:r>
-          </a:p>
-          <a:p>
-            <a:endParaRPr lang="en-US" sz="2800" b="1" dirty="0"/>
-          </a:p>
-        </p:txBody>
-      </p:sp>
-      <p:sp>
-        <p:nvSpPr>
-          <p:cNvPr id="4" name="TextBox 3">
-            <a:extLst>
-              <a:ext uri="{FF2B5EF4-FFF2-40B4-BE49-F238E27FC236}">
-                <a16:creationId xmlns:a16="http://schemas.microsoft.com/office/drawing/2014/main" xmlns="" id="{91B8C2B7-D83A-4DE3-8D72-2F8B77908725}"/>
-              </a:ext>
-            </a:extLst>
-          </p:cNvPr>
-          <p:cNvSpPr txBox="1"/>
-          <p:nvPr/>
-        </p:nvSpPr>
-        <p:spPr>
-          <a:xfrm>
-            <a:off x="6185648" y="6495301"/>
-            <a:ext cx="2689411" cy="369332"/>
-          </a:xfrm>
-          <a:prstGeom prst="rect">
-            <a:avLst/>
-          </a:prstGeom>
-          <a:noFill/>
-        </p:spPr>
-        <p:txBody>
-          <a:bodyPr wrap="square" rtlCol="0">
-            <a:spAutoFit/>
-          </a:bodyPr>
-          <a:lstStyle/>
-          <a:p>
-            <a:pPr algn="r"/>
-            <a:r>
-              <a:rPr lang="en-US" dirty="0" err="1"/>
-              <a:t>Royle</a:t>
-            </a:r>
-            <a:r>
-              <a:rPr lang="en-US" dirty="0"/>
-              <a:t> and </a:t>
-            </a:r>
-            <a:r>
-              <a:rPr lang="en-US" dirty="0" err="1"/>
-              <a:t>Dorazio</a:t>
-            </a:r>
-            <a:r>
-              <a:rPr lang="en-US" dirty="0"/>
-              <a:t> 2008</a:t>
-            </a:r>
-          </a:p>
-        </p:txBody>
-      </p:sp>
-      <p:sp>
-        <p:nvSpPr>
-          <p:cNvPr id="5" name="Slide Number Placeholder 4">
-            <a:extLst>
-              <a:ext uri="{FF2B5EF4-FFF2-40B4-BE49-F238E27FC236}">
-                <a16:creationId xmlns:a16="http://schemas.microsoft.com/office/drawing/2014/main" xmlns="" id="{6971F221-485F-4C23-B854-DC3A88CB94F2}"/>
-              </a:ext>
-            </a:extLst>
-          </p:cNvPr>
+              <a:rPr lang="en-US" dirty="0" smtClean="0"/>
+              <a:t>Monday – Review probability theory and numerical integration</a:t>
+            </a:r>
+            <a:endParaRPr lang="en-US" dirty="0" smtClean="0"/>
+          </a:p>
+          <a:p>
+            <a:r>
+              <a:rPr lang="en-US" dirty="0" smtClean="0"/>
+              <a:t>Tuesday – Bayesian inference and MCMC</a:t>
+            </a:r>
+            <a:endParaRPr lang="en-US" dirty="0" smtClean="0"/>
+          </a:p>
+          <a:p>
+            <a:r>
+              <a:rPr lang="en-US" dirty="0" smtClean="0"/>
+              <a:t>Wednesday – Bayesian workflow</a:t>
+            </a:r>
+            <a:endParaRPr lang="en-US" dirty="0" smtClean="0"/>
+          </a:p>
+          <a:p>
+            <a:r>
+              <a:rPr lang="en-US" dirty="0" smtClean="0"/>
+              <a:t>Thursday – Hierarchical models</a:t>
+            </a:r>
+            <a:endParaRPr lang="en-US" dirty="0" smtClean="0"/>
+          </a:p>
+          <a:p>
+            <a:r>
+              <a:rPr lang="en-US" dirty="0" smtClean="0"/>
+              <a:t>Friday – Stan and HMC w/ course review</a:t>
+            </a:r>
+            <a:endParaRPr lang="en-US" dirty="0" smtClean="0"/>
+          </a:p>
+        </p:txBody>
+      </p:sp>
+      <p:sp>
+        <p:nvSpPr>
+          <p:cNvPr id="4" name="Slide Number Placeholder 3"/>
           <p:cNvSpPr>
             <a:spLocks noGrp="1"/>
           </p:cNvSpPr>
@@ -8396,359 +7134,7 @@
     </p:spTree>
     <p:extLst>
       <p:ext uri="{BB962C8B-B14F-4D97-AF65-F5344CB8AC3E}">
-        <p14:creationId xmlns:p14="http://schemas.microsoft.com/office/powerpoint/2010/main" val="2530450770"/>
-      </p:ext>
-    </p:extLst>
-  </p:cSld>
-  <p:clrMapOvr>
-    <a:masterClrMapping/>
-  </p:clrMapOvr>
-</p:sld>
-</file>
-
-<file path=ppt/slides/slide9.xml><?xml version="1.0" encoding="utf-8"?>
-<p:sld xmlns:a="http://schemas.openxmlformats.org/drawingml/2006/main" xmlns:r="http://schemas.openxmlformats.org/officeDocument/2006/relationships" xmlns:p="http://schemas.openxmlformats.org/presentationml/2006/main">
-  <p:cSld>
-    <p:spTree>
-      <p:nvGrpSpPr>
-        <p:cNvPr id="1" name=""/>
-        <p:cNvGrpSpPr/>
-        <p:nvPr/>
-      </p:nvGrpSpPr>
-      <p:grpSpPr>
-        <a:xfrm>
-          <a:off x="0" y="0"/>
-          <a:ext cx="0" cy="0"/>
-          <a:chOff x="0" y="0"/>
-          <a:chExt cx="0" cy="0"/>
-        </a:xfrm>
-      </p:grpSpPr>
-      <p:sp>
-        <p:nvSpPr>
-          <p:cNvPr id="2" name="Title 1">
-            <a:extLst>
-              <a:ext uri="{FF2B5EF4-FFF2-40B4-BE49-F238E27FC236}">
-                <a16:creationId xmlns:a16="http://schemas.microsoft.com/office/drawing/2014/main" xmlns="" id="{E622C5D6-127E-4E13-A682-50C23F6FCCA3}"/>
-              </a:ext>
-            </a:extLst>
-          </p:cNvPr>
-          <p:cNvSpPr>
-            <a:spLocks noGrp="1"/>
-          </p:cNvSpPr>
-          <p:nvPr>
-            <p:ph type="title"/>
-          </p:nvPr>
-        </p:nvSpPr>
-        <p:spPr/>
-        <p:txBody>
-          <a:bodyPr/>
-          <a:lstStyle/>
-          <a:p>
-            <a:r>
-              <a:rPr lang="en-US" dirty="0"/>
-              <a:t>HM by </a:t>
-            </a:r>
-            <a:r>
-              <a:rPr lang="en-US" dirty="0" err="1"/>
-              <a:t>Royle</a:t>
-            </a:r>
-            <a:r>
-              <a:rPr lang="en-US" dirty="0"/>
-              <a:t> &amp; </a:t>
-            </a:r>
-            <a:r>
-              <a:rPr lang="en-US" dirty="0" err="1"/>
-              <a:t>Dorazio</a:t>
-            </a:r>
-            <a:endParaRPr lang="en-US" dirty="0"/>
-          </a:p>
-        </p:txBody>
-      </p:sp>
-      <p:sp>
-        <p:nvSpPr>
-          <p:cNvPr id="3" name="Content Placeholder 2">
-            <a:extLst>
-              <a:ext uri="{FF2B5EF4-FFF2-40B4-BE49-F238E27FC236}">
-                <a16:creationId xmlns:a16="http://schemas.microsoft.com/office/drawing/2014/main" xmlns="" id="{6C383712-B948-4BB6-80DA-20C80E766461}"/>
-              </a:ext>
-            </a:extLst>
-          </p:cNvPr>
-          <p:cNvSpPr>
-            <a:spLocks noGrp="1"/>
-          </p:cNvSpPr>
-          <p:nvPr>
-            <p:ph idx="1"/>
-          </p:nvPr>
-        </p:nvSpPr>
-        <p:spPr>
-          <a:xfrm>
-            <a:off x="628650" y="1249553"/>
-            <a:ext cx="7886700" cy="3364442"/>
-          </a:xfrm>
-        </p:spPr>
-        <p:txBody>
-          <a:bodyPr/>
-          <a:lstStyle/>
-          <a:p>
-            <a:r>
-              <a:rPr lang="en-US" dirty="0"/>
-              <a:t>Statistical models used widely in ecology</a:t>
-            </a:r>
-          </a:p>
-          <a:p>
-            <a:r>
-              <a:rPr lang="en-US" dirty="0"/>
-              <a:t>A “</a:t>
-            </a:r>
-            <a:r>
-              <a:rPr lang="en-US" i="1" dirty="0"/>
-              <a:t>conceptual and philosophical approach to doing science</a:t>
-            </a:r>
-            <a:r>
-              <a:rPr lang="en-US" dirty="0"/>
-              <a:t>” with distinct models:</a:t>
-            </a:r>
-          </a:p>
-          <a:p>
-            <a:pPr lvl="1"/>
-            <a:r>
-              <a:rPr lang="en-US" i="1" dirty="0"/>
-              <a:t>Observation: </a:t>
-            </a:r>
-            <a:r>
-              <a:rPr lang="en-US" dirty="0"/>
-              <a:t>How data are observed (with error), given the process</a:t>
-            </a:r>
-            <a:r>
-              <a:rPr lang="en-US" i="1" dirty="0"/>
-              <a:t>.</a:t>
-            </a:r>
-          </a:p>
-          <a:p>
-            <a:pPr lvl="1"/>
-            <a:r>
-              <a:rPr lang="en-US" i="1" dirty="0"/>
-              <a:t>Process:</a:t>
-            </a:r>
-            <a:r>
-              <a:rPr lang="en-US" dirty="0"/>
-              <a:t> Describes the dynamics of the ecological process (e.g. animal abundance over time/space)</a:t>
-            </a:r>
-          </a:p>
-        </p:txBody>
-      </p:sp>
-      <p:sp>
-        <p:nvSpPr>
-          <p:cNvPr id="4" name="TextBox 3">
-            <a:extLst>
-              <a:ext uri="{FF2B5EF4-FFF2-40B4-BE49-F238E27FC236}">
-                <a16:creationId xmlns:a16="http://schemas.microsoft.com/office/drawing/2014/main" xmlns="" id="{91B8C2B7-D83A-4DE3-8D72-2F8B77908725}"/>
-              </a:ext>
-            </a:extLst>
-          </p:cNvPr>
-          <p:cNvSpPr txBox="1"/>
-          <p:nvPr/>
-        </p:nvSpPr>
-        <p:spPr>
-          <a:xfrm>
-            <a:off x="6185648" y="6495301"/>
-            <a:ext cx="2689411" cy="369332"/>
-          </a:xfrm>
-          <a:prstGeom prst="rect">
-            <a:avLst/>
-          </a:prstGeom>
-          <a:noFill/>
-        </p:spPr>
-        <p:txBody>
-          <a:bodyPr wrap="square" rtlCol="0">
-            <a:spAutoFit/>
-          </a:bodyPr>
-          <a:lstStyle/>
-          <a:p>
-            <a:pPr algn="r"/>
-            <a:r>
-              <a:rPr lang="en-US" dirty="0" err="1"/>
-              <a:t>Royle</a:t>
-            </a:r>
-            <a:r>
-              <a:rPr lang="en-US" dirty="0"/>
-              <a:t> and </a:t>
-            </a:r>
-            <a:r>
-              <a:rPr lang="en-US" dirty="0" err="1"/>
-              <a:t>Dorazio</a:t>
-            </a:r>
-            <a:r>
-              <a:rPr lang="en-US" dirty="0"/>
-              <a:t> 2008</a:t>
-            </a:r>
-          </a:p>
-        </p:txBody>
-      </p:sp>
-      <p:sp>
-        <p:nvSpPr>
-          <p:cNvPr id="5" name="TextBox 4">
-            <a:extLst>
-              <a:ext uri="{FF2B5EF4-FFF2-40B4-BE49-F238E27FC236}">
-                <a16:creationId xmlns:a16="http://schemas.microsoft.com/office/drawing/2014/main" xmlns="" id="{E2E80CC1-A3B1-41D5-974D-84E31E682088}"/>
-              </a:ext>
-            </a:extLst>
-          </p:cNvPr>
-          <p:cNvSpPr txBox="1"/>
-          <p:nvPr/>
-        </p:nvSpPr>
-        <p:spPr>
-          <a:xfrm>
-            <a:off x="490070" y="5109076"/>
-            <a:ext cx="8163859" cy="461665"/>
-          </a:xfrm>
-          <a:prstGeom prst="rect">
-            <a:avLst/>
-          </a:prstGeom>
-          <a:noFill/>
-        </p:spPr>
-        <p:txBody>
-          <a:bodyPr wrap="square" rtlCol="0">
-            <a:spAutoFit/>
-          </a:bodyPr>
-          <a:lstStyle/>
-          <a:p>
-            <a:r>
-              <a:rPr lang="en-US" sz="2400" dirty="0"/>
-              <a:t>P(</a:t>
-            </a:r>
-            <a:r>
-              <a:rPr lang="en-US" sz="2400" dirty="0" err="1"/>
-              <a:t>data|process</a:t>
-            </a:r>
-            <a:r>
-              <a:rPr lang="en-US" sz="2400" dirty="0"/>
-              <a:t>, parameters)*P(</a:t>
-            </a:r>
-            <a:r>
-              <a:rPr lang="en-US" sz="2400" dirty="0" err="1"/>
-              <a:t>process|parameters</a:t>
-            </a:r>
-            <a:r>
-              <a:rPr lang="en-US" sz="2400" dirty="0"/>
-              <a:t>)</a:t>
-            </a:r>
-          </a:p>
-        </p:txBody>
-      </p:sp>
-      <p:sp>
-        <p:nvSpPr>
-          <p:cNvPr id="6" name="TextBox 5">
-            <a:extLst>
-              <a:ext uri="{FF2B5EF4-FFF2-40B4-BE49-F238E27FC236}">
-                <a16:creationId xmlns:a16="http://schemas.microsoft.com/office/drawing/2014/main" xmlns="" id="{B12D25C0-03D8-409E-917F-DE6130EAECAC}"/>
-              </a:ext>
-            </a:extLst>
-          </p:cNvPr>
-          <p:cNvSpPr txBox="1"/>
-          <p:nvPr/>
-        </p:nvSpPr>
-        <p:spPr>
-          <a:xfrm>
-            <a:off x="1346200" y="5601335"/>
-            <a:ext cx="2159000" cy="461665"/>
-          </a:xfrm>
-          <a:prstGeom prst="rect">
-            <a:avLst/>
-          </a:prstGeom>
-          <a:noFill/>
-        </p:spPr>
-        <p:txBody>
-          <a:bodyPr wrap="square" rtlCol="0">
-            <a:spAutoFit/>
-          </a:bodyPr>
-          <a:lstStyle/>
-          <a:p>
-            <a:pPr algn="ctr"/>
-            <a:r>
-              <a:rPr lang="en-US" sz="2400" b="1" dirty="0">
-                <a:solidFill>
-                  <a:srgbClr val="FF0000"/>
-                </a:solidFill>
-              </a:rPr>
-              <a:t>observation</a:t>
-            </a:r>
-          </a:p>
-        </p:txBody>
-      </p:sp>
-      <p:sp>
-        <p:nvSpPr>
-          <p:cNvPr id="7" name="TextBox 6">
-            <a:extLst>
-              <a:ext uri="{FF2B5EF4-FFF2-40B4-BE49-F238E27FC236}">
-                <a16:creationId xmlns:a16="http://schemas.microsoft.com/office/drawing/2014/main" xmlns="" id="{8793595C-EFFB-4B8A-9747-79DE331D32E6}"/>
-              </a:ext>
-            </a:extLst>
-          </p:cNvPr>
-          <p:cNvSpPr txBox="1"/>
-          <p:nvPr/>
-        </p:nvSpPr>
-        <p:spPr>
-          <a:xfrm>
-            <a:off x="5213951" y="5586078"/>
-            <a:ext cx="2159000" cy="461665"/>
-          </a:xfrm>
-          <a:prstGeom prst="rect">
-            <a:avLst/>
-          </a:prstGeom>
-          <a:noFill/>
-        </p:spPr>
-        <p:txBody>
-          <a:bodyPr wrap="square" rtlCol="0">
-            <a:spAutoFit/>
-          </a:bodyPr>
-          <a:lstStyle/>
-          <a:p>
-            <a:pPr algn="ctr"/>
-            <a:r>
-              <a:rPr lang="en-US" sz="2400" b="1" dirty="0">
-                <a:solidFill>
-                  <a:srgbClr val="FF0000"/>
-                </a:solidFill>
-              </a:rPr>
-              <a:t>process</a:t>
-            </a:r>
-          </a:p>
-        </p:txBody>
-      </p:sp>
-      <p:sp>
-        <p:nvSpPr>
-          <p:cNvPr id="8" name="Slide Number Placeholder 7">
-            <a:extLst>
-              <a:ext uri="{FF2B5EF4-FFF2-40B4-BE49-F238E27FC236}">
-                <a16:creationId xmlns:a16="http://schemas.microsoft.com/office/drawing/2014/main" xmlns="" id="{36492438-0541-48B4-890B-64DD7DC28530}"/>
-              </a:ext>
-            </a:extLst>
-          </p:cNvPr>
-          <p:cNvSpPr>
-            <a:spLocks noGrp="1"/>
-          </p:cNvSpPr>
-          <p:nvPr>
-            <p:ph type="sldNum" sz="quarter" idx="12"/>
-          </p:nvPr>
-        </p:nvSpPr>
-        <p:spPr/>
-        <p:txBody>
-          <a:bodyPr/>
-          <a:lstStyle/>
-          <a:p>
-            <a:fld id="{A90099C9-4CB8-9A40-B745-9AB270505907}" type="slidenum">
-              <a:rPr lang="en-US" smtClean="0"/>
-              <a:t>9</a:t>
-            </a:fld>
-            <a:endParaRPr lang="en-US"/>
-          </a:p>
-        </p:txBody>
-      </p:sp>
-    </p:spTree>
-    <p:extLst>
-      <p:ext uri="{BB962C8B-B14F-4D97-AF65-F5344CB8AC3E}">
-        <p14:creationId xmlns:p14="http://schemas.microsoft.com/office/powerpoint/2010/main" val="2136345693"/>
+        <p14:creationId xmlns:p14="http://schemas.microsoft.com/office/powerpoint/2010/main" val="3014722492"/>
       </p:ext>
     </p:extLst>
   </p:cSld>

</xml_diff>

<commit_message>
Fix typos in slides and make pdfs
</commit_message>
<xml_diff>
--- a/dia1/intro.pptx
+++ b/dia1/intro.pptx
@@ -223,7 +223,7 @@
           <a:p>
             <a:fld id="{0377424B-A23C-43FF-8673-376C6E767ED7}" type="datetimeFigureOut">
               <a:rPr lang="en-US" smtClean="0"/>
-              <a:t>1/13/2019</a:t>
+              <a:t>1/22/2019</a:t>
             </a:fld>
             <a:endParaRPr lang="en-US"/>
           </a:p>
@@ -572,7 +572,7 @@
           </a:ln>
           <a:extLst>
             <a:ext uri="{909E8E84-426E-40dd-AFC4-6F175D3DCCD1}">
-              <a14:hiddenFill xmlns:a14="http://schemas.microsoft.com/office/drawing/2010/main" xmlns="">
+              <a14:hiddenFill xmlns="" xmlns:a14="http://schemas.microsoft.com/office/drawing/2010/main">
                 <a:solidFill>
                   <a:srgbClr val="FFFFFF"/>
                 </a:solidFill>
@@ -615,7 +615,7 @@
           </a:ln>
           <a:extLst>
             <a:ext uri="{909E8E84-426E-40dd-AFC4-6F175D3DCCD1}">
-              <a14:hiddenFill xmlns:a14="http://schemas.microsoft.com/office/drawing/2010/main" xmlns="">
+              <a14:hiddenFill xmlns="" xmlns:a14="http://schemas.microsoft.com/office/drawing/2010/main">
                 <a:noFill/>
               </a14:hiddenFill>
             </a:ext>
@@ -714,7 +714,7 @@
           <a:p>
             <a:fld id="{BA23EE8D-9CE0-4F42-A40F-E28604EA7175}" type="datetime1">
               <a:rPr lang="en-US" smtClean="0"/>
-              <a:t>1/13/2019</a:t>
+              <a:t>1/22/2019</a:t>
             </a:fld>
             <a:endParaRPr lang="en-US"/>
           </a:p>
@@ -901,7 +901,7 @@
           <a:p>
             <a:fld id="{C602C5EE-1F52-440A-B21D-CF34717184B1}" type="datetime1">
               <a:rPr lang="en-US" smtClean="0"/>
-              <a:t>1/13/2019</a:t>
+              <a:t>1/22/2019</a:t>
             </a:fld>
             <a:endParaRPr lang="en-US"/>
           </a:p>
@@ -1097,7 +1097,7 @@
           <a:p>
             <a:fld id="{88EA7AC3-3927-460F-BC0A-B8263F635273}" type="datetime1">
               <a:rPr lang="en-US" smtClean="0"/>
-              <a:t>1/13/2019</a:t>
+              <a:t>1/22/2019</a:t>
             </a:fld>
             <a:endParaRPr lang="en-US"/>
           </a:p>
@@ -1349,7 +1349,7 @@
           <a:p>
             <a:fld id="{F134B72F-0B71-4FD2-BD20-28F3E78BBA16}" type="datetime1">
               <a:rPr lang="en-US" smtClean="0"/>
-              <a:t>1/13/2019</a:t>
+              <a:t>1/22/2019</a:t>
             </a:fld>
             <a:endParaRPr lang="en-US"/>
           </a:p>
@@ -1573,7 +1573,7 @@
           <a:p>
             <a:fld id="{E47B1B4E-0EC6-4546-B26A-C4455998E44E}" type="datetime1">
               <a:rPr lang="en-US" smtClean="0"/>
-              <a:t>1/13/2019</a:t>
+              <a:t>1/22/2019</a:t>
             </a:fld>
             <a:endParaRPr lang="en-US"/>
           </a:p>
@@ -1881,7 +1881,7 @@
           <a:p>
             <a:fld id="{C3A8C74C-0B69-4161-99E9-DF9818443EAA}" type="datetime1">
               <a:rPr lang="en-US" smtClean="0"/>
-              <a:t>1/13/2019</a:t>
+              <a:t>1/22/2019</a:t>
             </a:fld>
             <a:endParaRPr lang="en-US"/>
           </a:p>
@@ -2049,7 +2049,7 @@
           <a:p>
             <a:fld id="{4DFBF3A0-C444-4F34-BF5B-169E9D461035}" type="datetime1">
               <a:rPr lang="en-US" smtClean="0"/>
-              <a:t>1/13/2019</a:t>
+              <a:t>1/22/2019</a:t>
             </a:fld>
             <a:endParaRPr lang="en-US"/>
           </a:p>
@@ -2361,7 +2361,7 @@
           <a:p>
             <a:fld id="{E196B420-BADE-4187-9E75-E64276466004}" type="datetime1">
               <a:rPr lang="en-US" smtClean="0"/>
-              <a:t>1/13/2019</a:t>
+              <a:t>1/22/2019</a:t>
             </a:fld>
             <a:endParaRPr lang="en-US"/>
           </a:p>
@@ -2673,7 +2673,7 @@
           <a:p>
             <a:fld id="{FF00C915-A483-44DD-9703-2D268BDAA475}" type="datetime1">
               <a:rPr lang="en-US" smtClean="0"/>
-              <a:t>1/13/2019</a:t>
+              <a:t>1/22/2019</a:t>
             </a:fld>
             <a:endParaRPr lang="en-US"/>
           </a:p>
@@ -2859,7 +2859,7 @@
           <a:p>
             <a:fld id="{1A4DAFB5-4EEC-49BD-AB33-559CD6F558E3}" type="datetime1">
               <a:rPr lang="en-US" smtClean="0"/>
-              <a:t>1/13/2019</a:t>
+              <a:t>1/22/2019</a:t>
             </a:fld>
             <a:endParaRPr lang="en-US"/>
           </a:p>
@@ -3068,7 +3068,7 @@
           <a:p>
             <a:fld id="{1EE2056D-DC17-4607-87F9-EA4937BD48E2}" type="datetime1">
               <a:rPr lang="en-US" smtClean="0"/>
-              <a:t>1/13/2019</a:t>
+              <a:t>1/22/2019</a:t>
             </a:fld>
             <a:endParaRPr lang="en-US"/>
           </a:p>
@@ -3371,7 +3371,7 @@
           <a:p>
             <a:fld id="{866E3DAD-9254-43DE-A1F3-F1D56B1E5B5F}" type="datetime1">
               <a:rPr lang="en-US" smtClean="0"/>
-              <a:t>1/13/2019</a:t>
+              <a:t>1/22/2019</a:t>
             </a:fld>
             <a:endParaRPr lang="en-US"/>
           </a:p>
@@ -3813,7 +3813,7 @@
           <a:p>
             <a:fld id="{12F88D45-78A7-46A0-99B7-2046E351D366}" type="datetime1">
               <a:rPr lang="en-US" smtClean="0"/>
-              <a:t>1/13/2019</a:t>
+              <a:t>1/22/2019</a:t>
             </a:fld>
             <a:endParaRPr lang="en-US"/>
           </a:p>
@@ -3948,7 +3948,7 @@
           <a:p>
             <a:fld id="{7716AC84-6778-466F-95F9-3EEE8E306ABF}" type="datetime1">
               <a:rPr lang="en-US" smtClean="0"/>
-              <a:t>1/13/2019</a:t>
+              <a:t>1/22/2019</a:t>
             </a:fld>
             <a:endParaRPr lang="en-US"/>
           </a:p>
@@ -4061,7 +4061,7 @@
           <a:p>
             <a:fld id="{02DEDAFE-CBEF-41E8-868F-E40C867A5636}" type="datetime1">
               <a:rPr lang="en-US" smtClean="0"/>
-              <a:t>1/13/2019</a:t>
+              <a:t>1/22/2019</a:t>
             </a:fld>
             <a:endParaRPr lang="en-US"/>
           </a:p>
@@ -4354,7 +4354,7 @@
           <a:p>
             <a:fld id="{20C87E4D-F358-4436-A283-114607D95274}" type="datetime1">
               <a:rPr lang="en-US" smtClean="0"/>
-              <a:t>1/13/2019</a:t>
+              <a:t>1/22/2019</a:t>
             </a:fld>
             <a:endParaRPr lang="en-US"/>
           </a:p>
@@ -4628,7 +4628,7 @@
           <a:p>
             <a:fld id="{6CCABA82-8A7B-4924-987B-0B7221667B17}" type="datetime1">
               <a:rPr lang="en-US" smtClean="0"/>
-              <a:t>1/13/2019</a:t>
+              <a:t>1/22/2019</a:t>
             </a:fld>
             <a:endParaRPr lang="en-US"/>
           </a:p>
@@ -4750,17 +4750,17 @@
           </a:ln>
           <a:extLst>
             <a:ext uri="{FAA26D3D-D897-4be2-8F04-BA451C77F1D7}">
-              <ma14:placeholderFlag xmlns:ma14="http://schemas.microsoft.com/office/mac/drawingml/2011/main" xmlns="" val="1"/>
+              <ma14:placeholderFlag xmlns="" xmlns:ma14="http://schemas.microsoft.com/office/mac/drawingml/2011/main" val="1"/>
             </a:ext>
             <a:ext uri="{909E8E84-426E-40dd-AFC4-6F175D3DCCD1}">
-              <a14:hiddenFill xmlns:a14="http://schemas.microsoft.com/office/drawing/2010/main" xmlns="">
+              <a14:hiddenFill xmlns="" xmlns:a14="http://schemas.microsoft.com/office/drawing/2010/main">
                 <a:solidFill>
                   <a:srgbClr val="FFFFFF"/>
                 </a:solidFill>
               </a14:hiddenFill>
             </a:ext>
             <a:ext uri="{91240B29-F687-4f45-9708-019B960494DF}">
-              <a14:hiddenLine xmlns:a14="http://schemas.microsoft.com/office/drawing/2010/main" xmlns="" w="9525">
+              <a14:hiddenLine xmlns="" xmlns:a14="http://schemas.microsoft.com/office/drawing/2010/main" w="9525">
                 <a:solidFill>
                   <a:srgbClr val="000000"/>
                 </a:solidFill>
@@ -4812,17 +4812,17 @@
           </a:ln>
           <a:extLst>
             <a:ext uri="{FAA26D3D-D897-4be2-8F04-BA451C77F1D7}">
-              <ma14:placeholderFlag xmlns:ma14="http://schemas.microsoft.com/office/mac/drawingml/2011/main" xmlns="" val="1"/>
+              <ma14:placeholderFlag xmlns="" xmlns:ma14="http://schemas.microsoft.com/office/mac/drawingml/2011/main" val="1"/>
             </a:ext>
             <a:ext uri="{909E8E84-426E-40dd-AFC4-6F175D3DCCD1}">
-              <a14:hiddenFill xmlns:a14="http://schemas.microsoft.com/office/drawing/2010/main" xmlns="">
+              <a14:hiddenFill xmlns="" xmlns:a14="http://schemas.microsoft.com/office/drawing/2010/main">
                 <a:solidFill>
                   <a:srgbClr val="FFFFFF"/>
                 </a:solidFill>
               </a14:hiddenFill>
             </a:ext>
             <a:ext uri="{91240B29-F687-4f45-9708-019B960494DF}">
-              <a14:hiddenLine xmlns:a14="http://schemas.microsoft.com/office/drawing/2010/main" xmlns="" w="9525">
+              <a14:hiddenLine xmlns="" xmlns:a14="http://schemas.microsoft.com/office/drawing/2010/main" w="9525">
                 <a:solidFill>
                   <a:srgbClr val="000000"/>
                 </a:solidFill>
@@ -4922,7 +4922,7 @@
           <a:p>
             <a:fld id="{A7853F80-D63E-429F-B326-B00475E1D8E8}" type="datetime1">
               <a:rPr lang="en-US" smtClean="0"/>
-              <a:t>1/13/2019</a:t>
+              <a:t>1/22/2019</a:t>
             </a:fld>
             <a:endParaRPr lang="en-US"/>
           </a:p>
@@ -5090,7 +5090,7 @@
           </a:ln>
           <a:extLst>
             <a:ext uri="{909E8E84-426E-40dd-AFC4-6F175D3DCCD1}">
-              <a14:hiddenFill xmlns:a14="http://schemas.microsoft.com/office/drawing/2010/main" xmlns="">
+              <a14:hiddenFill xmlns="" xmlns:a14="http://schemas.microsoft.com/office/drawing/2010/main">
                 <a:solidFill>
                   <a:srgbClr val="FFFFFF"/>
                 </a:solidFill>
@@ -5133,7 +5133,7 @@
           </a:ln>
           <a:extLst>
             <a:ext uri="{909E8E84-426E-40dd-AFC4-6F175D3DCCD1}">
-              <a14:hiddenFill xmlns:a14="http://schemas.microsoft.com/office/drawing/2010/main" xmlns="">
+              <a14:hiddenFill xmlns="" xmlns:a14="http://schemas.microsoft.com/office/drawing/2010/main">
                 <a:noFill/>
               </a14:hiddenFill>
             </a:ext>
@@ -5618,7 +5618,7 @@
           <p:cNvPr id="2" name="Title 1">
             <a:extLst>
               <a:ext uri="{FF2B5EF4-FFF2-40B4-BE49-F238E27FC236}">
-                <a16:creationId xmlns="" xmlns:a16="http://schemas.microsoft.com/office/drawing/2014/main" id="{4819A39B-28BB-4873-9914-8FEE18891DD4}"/>
+                <a16:creationId xmlns:a16="http://schemas.microsoft.com/office/drawing/2014/main" xmlns="" id="{4819A39B-28BB-4873-9914-8FEE18891DD4}"/>
               </a:ext>
             </a:extLst>
           </p:cNvPr>
@@ -5649,7 +5649,7 @@
           <p:cNvPr id="5" name="Subtitle 2">
             <a:extLst>
               <a:ext uri="{FF2B5EF4-FFF2-40B4-BE49-F238E27FC236}">
-                <a16:creationId xmlns="" xmlns:a16="http://schemas.microsoft.com/office/drawing/2014/main" id="{2BECD79D-0B3A-44C2-A155-03EC2A6A5D3B}"/>
+                <a16:creationId xmlns:a16="http://schemas.microsoft.com/office/drawing/2014/main" xmlns="" id="{2BECD79D-0B3A-44C2-A155-03EC2A6A5D3B}"/>
               </a:ext>
             </a:extLst>
           </p:cNvPr>
@@ -5672,17 +5672,17 @@
           </a:ln>
           <a:extLst>
             <a:ext uri="{FAA26D3D-D897-4be2-8F04-BA451C77F1D7}">
-              <ma14:placeholderFlag xmlns:ma14="http://schemas.microsoft.com/office/mac/drawingml/2011/main" xmlns="" val="1"/>
+              <ma14:placeholderFlag xmlns="" xmlns:ma14="http://schemas.microsoft.com/office/mac/drawingml/2011/main" val="1"/>
             </a:ext>
             <a:ext uri="{909E8E84-426E-40dd-AFC4-6F175D3DCCD1}">
-              <a14:hiddenFill xmlns:a14="http://schemas.microsoft.com/office/drawing/2010/main" xmlns="">
+              <a14:hiddenFill xmlns="" xmlns:a14="http://schemas.microsoft.com/office/drawing/2010/main">
                 <a:solidFill>
                   <a:srgbClr val="FFFFFF"/>
                 </a:solidFill>
               </a14:hiddenFill>
             </a:ext>
             <a:ext uri="{91240B29-F687-4f45-9708-019B960494DF}">
-              <a14:hiddenLine xmlns:a14="http://schemas.microsoft.com/office/drawing/2010/main" xmlns="" w="9525">
+              <a14:hiddenLine xmlns="" xmlns:a14="http://schemas.microsoft.com/office/drawing/2010/main" w="9525">
                 <a:solidFill>
                   <a:srgbClr val="000000"/>
                 </a:solidFill>
@@ -6023,7 +6023,6 @@
               <a:rPr lang="es-419" dirty="0" smtClean="0"/>
               <a:t>Supongo que tienen experiencia con R</a:t>
             </a:r>
-            <a:endParaRPr lang="es-419" dirty="0" smtClean="0"/>
           </a:p>
           <a:p>
             <a:r>
@@ -6047,7 +6046,6 @@
               <a:rPr lang="es-419" dirty="0" smtClean="0"/>
               <a:t>Por las tardes haremos un ‘laboratorio’ donde practicaran habilidades aplicados </a:t>
             </a:r>
-            <a:endParaRPr lang="es-419" dirty="0" smtClean="0"/>
           </a:p>
         </p:txBody>
       </p:sp>
@@ -6268,13 +6266,8 @@
           <a:p>
             <a:r>
               <a:rPr lang="es-419" dirty="0" smtClean="0"/>
-              <a:t>Pensamientos, otras </a:t>
-            </a:r>
-            <a:r>
-              <a:rPr lang="es-419" dirty="0" smtClean="0"/>
-              <a:t>dudas?</a:t>
-            </a:r>
-            <a:endParaRPr lang="es-419" dirty="0" smtClean="0"/>
+              <a:t>Pensamientos, otras dudas?</a:t>
+            </a:r>
           </a:p>
           <a:p>
             <a:endParaRPr lang="es-419" dirty="0" smtClean="0"/>
@@ -6593,7 +6586,7 @@
           <p:cNvPr id="2" name="Title 1">
             <a:extLst>
               <a:ext uri="{FF2B5EF4-FFF2-40B4-BE49-F238E27FC236}">
-                <a16:creationId xmlns="" xmlns:a16="http://schemas.microsoft.com/office/drawing/2014/main" id="{DB90AC74-AA10-44E5-9AE2-55CBF2BF3808}"/>
+                <a16:creationId xmlns:a16="http://schemas.microsoft.com/office/drawing/2014/main" xmlns="" id="{DB90AC74-AA10-44E5-9AE2-55CBF2BF3808}"/>
               </a:ext>
             </a:extLst>
           </p:cNvPr>
@@ -6622,7 +6615,7 @@
           <p:cNvPr id="5" name="Picture 4">
             <a:extLst>
               <a:ext uri="{FF2B5EF4-FFF2-40B4-BE49-F238E27FC236}">
-                <a16:creationId xmlns="" xmlns:a16="http://schemas.microsoft.com/office/drawing/2014/main" id="{81C46DCB-CB1E-4B0A-9700-81BD751E3CF4}"/>
+                <a16:creationId xmlns:a16="http://schemas.microsoft.com/office/drawing/2014/main" xmlns="" id="{81C46DCB-CB1E-4B0A-9700-81BD751E3CF4}"/>
               </a:ext>
             </a:extLst>
           </p:cNvPr>
@@ -6651,7 +6644,7 @@
           <p:cNvPr id="4" name="Picture 3">
             <a:extLst>
               <a:ext uri="{FF2B5EF4-FFF2-40B4-BE49-F238E27FC236}">
-                <a16:creationId xmlns="" xmlns:a16="http://schemas.microsoft.com/office/drawing/2014/main" id="{53887027-52CB-4375-A600-4F711E4938B2}"/>
+                <a16:creationId xmlns:a16="http://schemas.microsoft.com/office/drawing/2014/main" xmlns="" id="{53887027-52CB-4375-A600-4F711E4938B2}"/>
               </a:ext>
             </a:extLst>
           </p:cNvPr>
@@ -6681,7 +6674,7 @@
           <p:cNvPr id="6" name="Content Placeholder 5">
             <a:extLst>
               <a:ext uri="{FF2B5EF4-FFF2-40B4-BE49-F238E27FC236}">
-                <a16:creationId xmlns="" xmlns:a16="http://schemas.microsoft.com/office/drawing/2014/main" id="{6EAE8C30-3901-4FCB-AA7A-EC3D93DB7AC3}"/>
+                <a16:creationId xmlns:a16="http://schemas.microsoft.com/office/drawing/2014/main" xmlns="" id="{6EAE8C30-3901-4FCB-AA7A-EC3D93DB7AC3}"/>
               </a:ext>
             </a:extLst>
           </p:cNvPr>
@@ -6743,7 +6736,7 @@
           <p:cNvPr id="2" name="Title 1">
             <a:extLst>
               <a:ext uri="{FF2B5EF4-FFF2-40B4-BE49-F238E27FC236}">
-                <a16:creationId xmlns="" xmlns:a16="http://schemas.microsoft.com/office/drawing/2014/main" id="{6CF2B640-BE73-42A6-924C-2E2187BD598F}"/>
+                <a16:creationId xmlns:a16="http://schemas.microsoft.com/office/drawing/2014/main" xmlns="" id="{6CF2B640-BE73-42A6-924C-2E2187BD598F}"/>
               </a:ext>
             </a:extLst>
           </p:cNvPr>
@@ -6776,7 +6769,7 @@
           <p:cNvPr id="3" name="Content Placeholder 2">
             <a:extLst>
               <a:ext uri="{FF2B5EF4-FFF2-40B4-BE49-F238E27FC236}">
-                <a16:creationId xmlns="" xmlns:a16="http://schemas.microsoft.com/office/drawing/2014/main" id="{2AD0FE82-5ACC-4BD4-AFCB-11570EF4139C}"/>
+                <a16:creationId xmlns:a16="http://schemas.microsoft.com/office/drawing/2014/main" xmlns="" id="{2AD0FE82-5ACC-4BD4-AFCB-11570EF4139C}"/>
               </a:ext>
             </a:extLst>
           </p:cNvPr>
@@ -6821,7 +6814,7 @@
           <p:cNvPr id="4" name="Picture 3">
             <a:extLst>
               <a:ext uri="{FF2B5EF4-FFF2-40B4-BE49-F238E27FC236}">
-                <a16:creationId xmlns="" xmlns:a16="http://schemas.microsoft.com/office/drawing/2014/main" id="{689B31E6-9782-484F-B455-184B81BAA6CF}"/>
+                <a16:creationId xmlns:a16="http://schemas.microsoft.com/office/drawing/2014/main" xmlns="" id="{689B31E6-9782-484F-B455-184B81BAA6CF}"/>
               </a:ext>
             </a:extLst>
           </p:cNvPr>
@@ -7382,7 +7375,7 @@
           <p:cNvPr id="2" name="Title 1">
             <a:extLst>
               <a:ext uri="{FF2B5EF4-FFF2-40B4-BE49-F238E27FC236}">
-                <a16:creationId xmlns="" xmlns:a16="http://schemas.microsoft.com/office/drawing/2014/main" id="{B8B4D507-C9FA-49F2-A4C2-A66BA63AD8FD}"/>
+                <a16:creationId xmlns:a16="http://schemas.microsoft.com/office/drawing/2014/main" xmlns="" id="{B8B4D507-C9FA-49F2-A4C2-A66BA63AD8FD}"/>
               </a:ext>
             </a:extLst>
           </p:cNvPr>
@@ -7411,7 +7404,7 @@
           <p:cNvPr id="3" name="Content Placeholder 2">
             <a:extLst>
               <a:ext uri="{FF2B5EF4-FFF2-40B4-BE49-F238E27FC236}">
-                <a16:creationId xmlns="" xmlns:a16="http://schemas.microsoft.com/office/drawing/2014/main" id="{F71EA7B9-01B7-4DEE-B9B5-44F8406ECC23}"/>
+                <a16:creationId xmlns:a16="http://schemas.microsoft.com/office/drawing/2014/main" xmlns="" id="{F71EA7B9-01B7-4DEE-B9B5-44F8406ECC23}"/>
               </a:ext>
             </a:extLst>
           </p:cNvPr>
@@ -7483,7 +7476,7 @@
           <p:cNvPr id="4" name="Slide Number Placeholder 3">
             <a:extLst>
               <a:ext uri="{FF2B5EF4-FFF2-40B4-BE49-F238E27FC236}">
-                <a16:creationId xmlns="" xmlns:a16="http://schemas.microsoft.com/office/drawing/2014/main" id="{B72ADAC1-E81C-496A-88FD-83B794DF84D4}"/>
+                <a16:creationId xmlns:a16="http://schemas.microsoft.com/office/drawing/2014/main" xmlns="" id="{B72ADAC1-E81C-496A-88FD-83B794DF84D4}"/>
               </a:ext>
             </a:extLst>
           </p:cNvPr>

</xml_diff>